<commit_message>
arbeit arbeit -> dabu dabu
</commit_message>
<xml_diff>
--- a/documentation/Ada Chat.pptx
+++ b/documentation/Ada Chat.pptx
@@ -4,9 +4,21 @@
   <p:sldMasterIdLst>
     <p:sldMasterId id="2147483648" r:id="rId1"/>
   </p:sldMasterIdLst>
+  <p:notesMasterIdLst>
+    <p:notesMasterId r:id="rId13"/>
+  </p:notesMasterIdLst>
   <p:sldIdLst>
     <p:sldId id="256" r:id="rId2"/>
     <p:sldId id="257" r:id="rId3"/>
+    <p:sldId id="258" r:id="rId4"/>
+    <p:sldId id="259" r:id="rId5"/>
+    <p:sldId id="260" r:id="rId6"/>
+    <p:sldId id="261" r:id="rId7"/>
+    <p:sldId id="265" r:id="rId8"/>
+    <p:sldId id="262" r:id="rId9"/>
+    <p:sldId id="263" r:id="rId10"/>
+    <p:sldId id="264" r:id="rId11"/>
+    <p:sldId id="266" r:id="rId12"/>
   </p:sldIdLst>
   <p:sldSz cx="9144000" cy="6858000" type="screen4x3"/>
   <p:notesSz cx="6858000" cy="9144000"/>
@@ -111,6 +123,448 @@
     </p:ext>
   </p:extLst>
 </p:presentation>
+</file>
+
+<file path=ppt/notesMasters/notesMaster1.xml><?xml version="1.0" encoding="utf-8"?>
+<p:notesMaster xmlns:a="http://schemas.openxmlformats.org/drawingml/2006/main" xmlns:r="http://schemas.openxmlformats.org/officeDocument/2006/relationships" xmlns:p="http://schemas.openxmlformats.org/presentationml/2006/main">
+  <p:cSld>
+    <p:bg>
+      <p:bgRef idx="1001">
+        <a:schemeClr val="bg1"/>
+      </p:bgRef>
+    </p:bg>
+    <p:spTree>
+      <p:nvGrpSpPr>
+        <p:cNvPr id="1" name=""/>
+        <p:cNvGrpSpPr/>
+        <p:nvPr/>
+      </p:nvGrpSpPr>
+      <p:grpSpPr>
+        <a:xfrm>
+          <a:off x="0" y="0"/>
+          <a:ext cx="0" cy="0"/>
+          <a:chOff x="0" y="0"/>
+          <a:chExt cx="0" cy="0"/>
+        </a:xfrm>
+      </p:grpSpPr>
+      <p:sp>
+        <p:nvSpPr>
+          <p:cNvPr id="2" name="Kopfzeilenplatzhalter 1"/>
+          <p:cNvSpPr>
+            <a:spLocks noGrp="1"/>
+          </p:cNvSpPr>
+          <p:nvPr>
+            <p:ph type="hdr" sz="quarter"/>
+          </p:nvPr>
+        </p:nvSpPr>
+        <p:spPr>
+          <a:xfrm>
+            <a:off x="0" y="0"/>
+            <a:ext cx="2971800" cy="458788"/>
+          </a:xfrm>
+          <a:prstGeom prst="rect">
+            <a:avLst/>
+          </a:prstGeom>
+        </p:spPr>
+        <p:txBody>
+          <a:bodyPr vert="horz" lIns="91440" tIns="45720" rIns="91440" bIns="45720" rtlCol="0"/>
+          <a:lstStyle>
+            <a:lvl1pPr algn="l">
+              <a:defRPr sz="1200"/>
+            </a:lvl1pPr>
+          </a:lstStyle>
+          <a:p>
+            <a:endParaRPr lang="de-DE"/>
+          </a:p>
+        </p:txBody>
+      </p:sp>
+      <p:sp>
+        <p:nvSpPr>
+          <p:cNvPr id="3" name="Datumsplatzhalter 2"/>
+          <p:cNvSpPr>
+            <a:spLocks noGrp="1"/>
+          </p:cNvSpPr>
+          <p:nvPr>
+            <p:ph type="dt" idx="1"/>
+          </p:nvPr>
+        </p:nvSpPr>
+        <p:spPr>
+          <a:xfrm>
+            <a:off x="3884613" y="0"/>
+            <a:ext cx="2971800" cy="458788"/>
+          </a:xfrm>
+          <a:prstGeom prst="rect">
+            <a:avLst/>
+          </a:prstGeom>
+        </p:spPr>
+        <p:txBody>
+          <a:bodyPr vert="horz" lIns="91440" tIns="45720" rIns="91440" bIns="45720" rtlCol="0"/>
+          <a:lstStyle>
+            <a:lvl1pPr algn="r">
+              <a:defRPr sz="1200"/>
+            </a:lvl1pPr>
+          </a:lstStyle>
+          <a:p>
+            <a:fld id="{17D3A48C-A592-4DCA-964C-2AA7FC1C9F64}" type="datetimeFigureOut">
+              <a:rPr lang="de-DE" smtClean="0"/>
+              <a:t>08.05.2016</a:t>
+            </a:fld>
+            <a:endParaRPr lang="de-DE"/>
+          </a:p>
+        </p:txBody>
+      </p:sp>
+      <p:sp>
+        <p:nvSpPr>
+          <p:cNvPr id="4" name="Folienbildplatzhalter 3"/>
+          <p:cNvSpPr>
+            <a:spLocks noGrp="1" noRot="1" noChangeAspect="1"/>
+          </p:cNvSpPr>
+          <p:nvPr>
+            <p:ph type="sldImg" idx="2"/>
+          </p:nvPr>
+        </p:nvSpPr>
+        <p:spPr>
+          <a:xfrm>
+            <a:off x="1371600" y="1143000"/>
+            <a:ext cx="4114800" cy="3086100"/>
+          </a:xfrm>
+          <a:prstGeom prst="rect">
+            <a:avLst/>
+          </a:prstGeom>
+          <a:noFill/>
+          <a:ln w="12700">
+            <a:solidFill>
+              <a:prstClr val="black"/>
+            </a:solidFill>
+          </a:ln>
+        </p:spPr>
+        <p:txBody>
+          <a:bodyPr vert="horz" lIns="91440" tIns="45720" rIns="91440" bIns="45720" rtlCol="0" anchor="ctr"/>
+          <a:lstStyle/>
+          <a:p>
+            <a:endParaRPr lang="de-DE"/>
+          </a:p>
+        </p:txBody>
+      </p:sp>
+      <p:sp>
+        <p:nvSpPr>
+          <p:cNvPr id="5" name="Notizenplatzhalter 4"/>
+          <p:cNvSpPr>
+            <a:spLocks noGrp="1"/>
+          </p:cNvSpPr>
+          <p:nvPr>
+            <p:ph type="body" sz="quarter" idx="3"/>
+          </p:nvPr>
+        </p:nvSpPr>
+        <p:spPr>
+          <a:xfrm>
+            <a:off x="685800" y="4400550"/>
+            <a:ext cx="5486400" cy="3600450"/>
+          </a:xfrm>
+          <a:prstGeom prst="rect">
+            <a:avLst/>
+          </a:prstGeom>
+        </p:spPr>
+        <p:txBody>
+          <a:bodyPr vert="horz" lIns="91440" tIns="45720" rIns="91440" bIns="45720" rtlCol="0"/>
+          <a:lstStyle/>
+          <a:p>
+            <a:pPr lvl="0"/>
+            <a:r>
+              <a:rPr lang="de-DE" smtClean="0"/>
+              <a:t>Textmasterformat bearbeiten</a:t>
+            </a:r>
+          </a:p>
+          <a:p>
+            <a:pPr lvl="1"/>
+            <a:r>
+              <a:rPr lang="de-DE" smtClean="0"/>
+              <a:t>Zweite Ebene</a:t>
+            </a:r>
+          </a:p>
+          <a:p>
+            <a:pPr lvl="2"/>
+            <a:r>
+              <a:rPr lang="de-DE" smtClean="0"/>
+              <a:t>Dritte Ebene</a:t>
+            </a:r>
+          </a:p>
+          <a:p>
+            <a:pPr lvl="3"/>
+            <a:r>
+              <a:rPr lang="de-DE" smtClean="0"/>
+              <a:t>Vierte Ebene</a:t>
+            </a:r>
+          </a:p>
+          <a:p>
+            <a:pPr lvl="4"/>
+            <a:r>
+              <a:rPr lang="de-DE" smtClean="0"/>
+              <a:t>Fünfte Ebene</a:t>
+            </a:r>
+            <a:endParaRPr lang="de-DE"/>
+          </a:p>
+        </p:txBody>
+      </p:sp>
+      <p:sp>
+        <p:nvSpPr>
+          <p:cNvPr id="6" name="Fußzeilenplatzhalter 5"/>
+          <p:cNvSpPr>
+            <a:spLocks noGrp="1"/>
+          </p:cNvSpPr>
+          <p:nvPr>
+            <p:ph type="ftr" sz="quarter" idx="4"/>
+          </p:nvPr>
+        </p:nvSpPr>
+        <p:spPr>
+          <a:xfrm>
+            <a:off x="0" y="8685213"/>
+            <a:ext cx="2971800" cy="458787"/>
+          </a:xfrm>
+          <a:prstGeom prst="rect">
+            <a:avLst/>
+          </a:prstGeom>
+        </p:spPr>
+        <p:txBody>
+          <a:bodyPr vert="horz" lIns="91440" tIns="45720" rIns="91440" bIns="45720" rtlCol="0" anchor="b"/>
+          <a:lstStyle>
+            <a:lvl1pPr algn="l">
+              <a:defRPr sz="1200"/>
+            </a:lvl1pPr>
+          </a:lstStyle>
+          <a:p>
+            <a:endParaRPr lang="de-DE"/>
+          </a:p>
+        </p:txBody>
+      </p:sp>
+      <p:sp>
+        <p:nvSpPr>
+          <p:cNvPr id="7" name="Foliennummernplatzhalter 6"/>
+          <p:cNvSpPr>
+            <a:spLocks noGrp="1"/>
+          </p:cNvSpPr>
+          <p:nvPr>
+            <p:ph type="sldNum" sz="quarter" idx="5"/>
+          </p:nvPr>
+        </p:nvSpPr>
+        <p:spPr>
+          <a:xfrm>
+            <a:off x="3884613" y="8685213"/>
+            <a:ext cx="2971800" cy="458787"/>
+          </a:xfrm>
+          <a:prstGeom prst="rect">
+            <a:avLst/>
+          </a:prstGeom>
+        </p:spPr>
+        <p:txBody>
+          <a:bodyPr vert="horz" lIns="91440" tIns="45720" rIns="91440" bIns="45720" rtlCol="0" anchor="b"/>
+          <a:lstStyle>
+            <a:lvl1pPr algn="r">
+              <a:defRPr sz="1200"/>
+            </a:lvl1pPr>
+          </a:lstStyle>
+          <a:p>
+            <a:fld id="{B86A5C8B-E559-406D-A6CE-B08D815A3D7D}" type="slidenum">
+              <a:rPr lang="de-DE" smtClean="0"/>
+              <a:t>‹Nr.›</a:t>
+            </a:fld>
+            <a:endParaRPr lang="de-DE"/>
+          </a:p>
+        </p:txBody>
+      </p:sp>
+    </p:spTree>
+    <p:extLst>
+      <p:ext uri="{BB962C8B-B14F-4D97-AF65-F5344CB8AC3E}">
+        <p14:creationId xmlns:p14="http://schemas.microsoft.com/office/powerpoint/2010/main" val="642917521"/>
+      </p:ext>
+    </p:extLst>
+  </p:cSld>
+  <p:clrMap bg1="lt1" tx1="dk1" bg2="lt2" tx2="dk2" accent1="accent1" accent2="accent2" accent3="accent3" accent4="accent4" accent5="accent5" accent6="accent6" hlink="hlink" folHlink="folHlink"/>
+  <p:notesStyle>
+    <a:lvl1pPr marL="0" algn="l" defTabSz="914400" rtl="0" eaLnBrk="1" latinLnBrk="0" hangingPunct="1">
+      <a:defRPr sz="1200" kern="1200">
+        <a:solidFill>
+          <a:schemeClr val="tx1"/>
+        </a:solidFill>
+        <a:latin typeface="+mn-lt"/>
+        <a:ea typeface="+mn-ea"/>
+        <a:cs typeface="+mn-cs"/>
+      </a:defRPr>
+    </a:lvl1pPr>
+    <a:lvl2pPr marL="457200" algn="l" defTabSz="914400" rtl="0" eaLnBrk="1" latinLnBrk="0" hangingPunct="1">
+      <a:defRPr sz="1200" kern="1200">
+        <a:solidFill>
+          <a:schemeClr val="tx1"/>
+        </a:solidFill>
+        <a:latin typeface="+mn-lt"/>
+        <a:ea typeface="+mn-ea"/>
+        <a:cs typeface="+mn-cs"/>
+      </a:defRPr>
+    </a:lvl2pPr>
+    <a:lvl3pPr marL="914400" algn="l" defTabSz="914400" rtl="0" eaLnBrk="1" latinLnBrk="0" hangingPunct="1">
+      <a:defRPr sz="1200" kern="1200">
+        <a:solidFill>
+          <a:schemeClr val="tx1"/>
+        </a:solidFill>
+        <a:latin typeface="+mn-lt"/>
+        <a:ea typeface="+mn-ea"/>
+        <a:cs typeface="+mn-cs"/>
+      </a:defRPr>
+    </a:lvl3pPr>
+    <a:lvl4pPr marL="1371600" algn="l" defTabSz="914400" rtl="0" eaLnBrk="1" latinLnBrk="0" hangingPunct="1">
+      <a:defRPr sz="1200" kern="1200">
+        <a:solidFill>
+          <a:schemeClr val="tx1"/>
+        </a:solidFill>
+        <a:latin typeface="+mn-lt"/>
+        <a:ea typeface="+mn-ea"/>
+        <a:cs typeface="+mn-cs"/>
+      </a:defRPr>
+    </a:lvl4pPr>
+    <a:lvl5pPr marL="1828800" algn="l" defTabSz="914400" rtl="0" eaLnBrk="1" latinLnBrk="0" hangingPunct="1">
+      <a:defRPr sz="1200" kern="1200">
+        <a:solidFill>
+          <a:schemeClr val="tx1"/>
+        </a:solidFill>
+        <a:latin typeface="+mn-lt"/>
+        <a:ea typeface="+mn-ea"/>
+        <a:cs typeface="+mn-cs"/>
+      </a:defRPr>
+    </a:lvl5pPr>
+    <a:lvl6pPr marL="2286000" algn="l" defTabSz="914400" rtl="0" eaLnBrk="1" latinLnBrk="0" hangingPunct="1">
+      <a:defRPr sz="1200" kern="1200">
+        <a:solidFill>
+          <a:schemeClr val="tx1"/>
+        </a:solidFill>
+        <a:latin typeface="+mn-lt"/>
+        <a:ea typeface="+mn-ea"/>
+        <a:cs typeface="+mn-cs"/>
+      </a:defRPr>
+    </a:lvl6pPr>
+    <a:lvl7pPr marL="2743200" algn="l" defTabSz="914400" rtl="0" eaLnBrk="1" latinLnBrk="0" hangingPunct="1">
+      <a:defRPr sz="1200" kern="1200">
+        <a:solidFill>
+          <a:schemeClr val="tx1"/>
+        </a:solidFill>
+        <a:latin typeface="+mn-lt"/>
+        <a:ea typeface="+mn-ea"/>
+        <a:cs typeface="+mn-cs"/>
+      </a:defRPr>
+    </a:lvl7pPr>
+    <a:lvl8pPr marL="3200400" algn="l" defTabSz="914400" rtl="0" eaLnBrk="1" latinLnBrk="0" hangingPunct="1">
+      <a:defRPr sz="1200" kern="1200">
+        <a:solidFill>
+          <a:schemeClr val="tx1"/>
+        </a:solidFill>
+        <a:latin typeface="+mn-lt"/>
+        <a:ea typeface="+mn-ea"/>
+        <a:cs typeface="+mn-cs"/>
+      </a:defRPr>
+    </a:lvl8pPr>
+    <a:lvl9pPr marL="3657600" algn="l" defTabSz="914400" rtl="0" eaLnBrk="1" latinLnBrk="0" hangingPunct="1">
+      <a:defRPr sz="1200" kern="1200">
+        <a:solidFill>
+          <a:schemeClr val="tx1"/>
+        </a:solidFill>
+        <a:latin typeface="+mn-lt"/>
+        <a:ea typeface="+mn-ea"/>
+        <a:cs typeface="+mn-cs"/>
+      </a:defRPr>
+    </a:lvl9pPr>
+  </p:notesStyle>
+</p:notesMaster>
+</file>
+
+<file path=ppt/notesSlides/notesSlide1.xml><?xml version="1.0" encoding="utf-8"?>
+<p:notes xmlns:a="http://schemas.openxmlformats.org/drawingml/2006/main" xmlns:r="http://schemas.openxmlformats.org/officeDocument/2006/relationships" xmlns:p="http://schemas.openxmlformats.org/presentationml/2006/main">
+  <p:cSld>
+    <p:spTree>
+      <p:nvGrpSpPr>
+        <p:cNvPr id="1" name=""/>
+        <p:cNvGrpSpPr/>
+        <p:nvPr/>
+      </p:nvGrpSpPr>
+      <p:grpSpPr>
+        <a:xfrm>
+          <a:off x="0" y="0"/>
+          <a:ext cx="0" cy="0"/>
+          <a:chOff x="0" y="0"/>
+          <a:chExt cx="0" cy="0"/>
+        </a:xfrm>
+      </p:grpSpPr>
+      <p:sp>
+        <p:nvSpPr>
+          <p:cNvPr id="2" name="Folienbildplatzhalter 1"/>
+          <p:cNvSpPr>
+            <a:spLocks noGrp="1" noRot="1" noChangeAspect="1"/>
+          </p:cNvSpPr>
+          <p:nvPr>
+            <p:ph type="sldImg"/>
+          </p:nvPr>
+        </p:nvSpPr>
+        <p:spPr/>
+      </p:sp>
+      <p:sp>
+        <p:nvSpPr>
+          <p:cNvPr id="3" name="Notizenplatzhalter 2"/>
+          <p:cNvSpPr>
+            <a:spLocks noGrp="1"/>
+          </p:cNvSpPr>
+          <p:nvPr>
+            <p:ph type="body" idx="1"/>
+          </p:nvPr>
+        </p:nvSpPr>
+        <p:spPr/>
+        <p:txBody>
+          <a:bodyPr/>
+          <a:lstStyle/>
+          <a:p>
+            <a:r>
+              <a:rPr lang="de-DE" dirty="0" smtClean="0"/>
+              <a:t>Warum</a:t>
+            </a:r>
+            <a:r>
+              <a:rPr lang="de-DE" baseline="0" dirty="0" smtClean="0"/>
+              <a:t> Chat? Gute Abdeckung der Kursinhalte (diese nennen: Nebenläufigkeitskonzepte Ada, GUI mit GTK, Objektorientiert…), gut auf die Gruppenmitglieder aufteilbar, grobes Anreißen der Funktionalität</a:t>
+            </a:r>
+            <a:endParaRPr lang="de-DE" dirty="0"/>
+          </a:p>
+        </p:txBody>
+      </p:sp>
+      <p:sp>
+        <p:nvSpPr>
+          <p:cNvPr id="4" name="Foliennummernplatzhalter 3"/>
+          <p:cNvSpPr>
+            <a:spLocks noGrp="1"/>
+          </p:cNvSpPr>
+          <p:nvPr>
+            <p:ph type="sldNum" sz="quarter" idx="10"/>
+          </p:nvPr>
+        </p:nvSpPr>
+        <p:spPr/>
+        <p:txBody>
+          <a:bodyPr/>
+          <a:lstStyle/>
+          <a:p>
+            <a:fld id="{B86A5C8B-E559-406D-A6CE-B08D815A3D7D}" type="slidenum">
+              <a:rPr lang="de-DE" smtClean="0"/>
+              <a:t>3</a:t>
+            </a:fld>
+            <a:endParaRPr lang="de-DE"/>
+          </a:p>
+        </p:txBody>
+      </p:sp>
+    </p:spTree>
+    <p:extLst>
+      <p:ext uri="{BB962C8B-B14F-4D97-AF65-F5344CB8AC3E}">
+        <p14:creationId xmlns:p14="http://schemas.microsoft.com/office/powerpoint/2010/main" val="3149184629"/>
+      </p:ext>
+    </p:extLst>
+  </p:cSld>
+  <p:clrMapOvr>
+    <a:masterClrMapping/>
+  </p:clrMapOvr>
+</p:notes>
 </file>
 
 <file path=ppt/slideLayouts/slideLayout1.xml><?xml version="1.0" encoding="utf-8"?>
@@ -1465,6 +1919,1312 @@
 </p:sld>
 </file>
 
+<file path=ppt/slides/slide10.xml><?xml version="1.0" encoding="utf-8"?>
+<p:sld xmlns:a="http://schemas.openxmlformats.org/drawingml/2006/main" xmlns:r="http://schemas.openxmlformats.org/officeDocument/2006/relationships" xmlns:p="http://schemas.openxmlformats.org/presentationml/2006/main">
+  <p:cSld>
+    <p:spTree>
+      <p:nvGrpSpPr>
+        <p:cNvPr id="1" name=""/>
+        <p:cNvGrpSpPr/>
+        <p:nvPr/>
+      </p:nvGrpSpPr>
+      <p:grpSpPr>
+        <a:xfrm>
+          <a:off x="0" y="0"/>
+          <a:ext cx="0" cy="0"/>
+          <a:chOff x="0" y="0"/>
+          <a:chExt cx="0" cy="0"/>
+        </a:xfrm>
+      </p:grpSpPr>
+      <p:sp>
+        <p:nvSpPr>
+          <p:cNvPr id="2" name="Titel 1"/>
+          <p:cNvSpPr>
+            <a:spLocks noGrp="1"/>
+          </p:cNvSpPr>
+          <p:nvPr>
+            <p:ph type="title"/>
+          </p:nvPr>
+        </p:nvSpPr>
+        <p:spPr>
+          <a:xfrm>
+            <a:off x="360000" y="1317222"/>
+            <a:ext cx="8246118" cy="569556"/>
+          </a:xfrm>
+        </p:spPr>
+        <p:txBody>
+          <a:bodyPr/>
+          <a:lstStyle/>
+          <a:p>
+            <a:r>
+              <a:rPr lang="de-DE" dirty="0" smtClean="0"/>
+              <a:t>Hindernisse</a:t>
+            </a:r>
+            <a:endParaRPr lang="de-DE" dirty="0"/>
+          </a:p>
+        </p:txBody>
+      </p:sp>
+      <p:sp>
+        <p:nvSpPr>
+          <p:cNvPr id="3" name="Inhaltsplatzhalter 2"/>
+          <p:cNvSpPr>
+            <a:spLocks noGrp="1"/>
+          </p:cNvSpPr>
+          <p:nvPr>
+            <p:ph idx="1"/>
+          </p:nvPr>
+        </p:nvSpPr>
+        <p:spPr/>
+        <p:txBody>
+          <a:bodyPr/>
+          <a:lstStyle/>
+          <a:p>
+            <a:r>
+              <a:rPr lang="de-DE" dirty="0" smtClean="0"/>
+              <a:t>Dokumentation von Ada und GTK</a:t>
+            </a:r>
+          </a:p>
+          <a:p>
+            <a:r>
+              <a:rPr lang="de-DE" dirty="0" smtClean="0"/>
+              <a:t>Zirkuläre Abhängigkeiten</a:t>
+            </a:r>
+          </a:p>
+          <a:p>
+            <a:r>
+              <a:rPr lang="de-DE" dirty="0" smtClean="0"/>
+              <a:t>Pointer Verhalten unklar, wann Call </a:t>
+            </a:r>
+            <a:r>
+              <a:rPr lang="de-DE" dirty="0" err="1" smtClean="0"/>
+              <a:t>by</a:t>
+            </a:r>
+            <a:r>
+              <a:rPr lang="de-DE" dirty="0" smtClean="0"/>
+              <a:t> Value wann Call </a:t>
+            </a:r>
+            <a:r>
+              <a:rPr lang="de-DE" dirty="0" err="1" smtClean="0"/>
+              <a:t>by</a:t>
+            </a:r>
+            <a:r>
+              <a:rPr lang="de-DE" dirty="0" smtClean="0"/>
+              <a:t> Reference </a:t>
+            </a:r>
+          </a:p>
+          <a:p>
+            <a:r>
+              <a:rPr lang="de-DE" dirty="0" err="1" smtClean="0"/>
+              <a:t>Compilermagic</a:t>
+            </a:r>
+            <a:endParaRPr lang="de-DE" dirty="0"/>
+          </a:p>
+        </p:txBody>
+      </p:sp>
+    </p:spTree>
+    <p:extLst>
+      <p:ext uri="{BB962C8B-B14F-4D97-AF65-F5344CB8AC3E}">
+        <p14:creationId xmlns:p14="http://schemas.microsoft.com/office/powerpoint/2010/main" val="2243141793"/>
+      </p:ext>
+    </p:extLst>
+  </p:cSld>
+  <p:clrMapOvr>
+    <a:masterClrMapping/>
+  </p:clrMapOvr>
+  <p:timing>
+    <p:tnLst>
+      <p:par>
+        <p:cTn id="1" dur="indefinite" restart="never" nodeType="tmRoot"/>
+      </p:par>
+    </p:tnLst>
+  </p:timing>
+</p:sld>
+</file>
+
+<file path=ppt/slides/slide11.xml><?xml version="1.0" encoding="utf-8"?>
+<p:sld xmlns:a="http://schemas.openxmlformats.org/drawingml/2006/main" xmlns:r="http://schemas.openxmlformats.org/officeDocument/2006/relationships" xmlns:p="http://schemas.openxmlformats.org/presentationml/2006/main">
+  <p:cSld>
+    <p:spTree>
+      <p:nvGrpSpPr>
+        <p:cNvPr id="1" name=""/>
+        <p:cNvGrpSpPr/>
+        <p:nvPr/>
+      </p:nvGrpSpPr>
+      <p:grpSpPr>
+        <a:xfrm>
+          <a:off x="0" y="0"/>
+          <a:ext cx="0" cy="0"/>
+          <a:chOff x="0" y="0"/>
+          <a:chExt cx="0" cy="0"/>
+        </a:xfrm>
+      </p:grpSpPr>
+      <p:sp>
+        <p:nvSpPr>
+          <p:cNvPr id="2" name="Titel 1"/>
+          <p:cNvSpPr>
+            <a:spLocks noGrp="1"/>
+          </p:cNvSpPr>
+          <p:nvPr>
+            <p:ph type="title"/>
+          </p:nvPr>
+        </p:nvSpPr>
+        <p:spPr>
+          <a:xfrm>
+            <a:off x="360000" y="1317222"/>
+            <a:ext cx="8246118" cy="569556"/>
+          </a:xfrm>
+        </p:spPr>
+        <p:txBody>
+          <a:bodyPr/>
+          <a:lstStyle/>
+          <a:p>
+            <a:r>
+              <a:rPr lang="de-DE" dirty="0" smtClean="0"/>
+              <a:t>Implementierungslogik – anderes Wort finden</a:t>
+            </a:r>
+            <a:endParaRPr lang="de-DE" dirty="0"/>
+          </a:p>
+        </p:txBody>
+      </p:sp>
+      <p:sp>
+        <p:nvSpPr>
+          <p:cNvPr id="7" name="Gestreifter Pfeil nach rechts 6"/>
+          <p:cNvSpPr/>
+          <p:nvPr/>
+        </p:nvSpPr>
+        <p:spPr>
+          <a:xfrm rot="5400000">
+            <a:off x="391202" y="2898741"/>
+            <a:ext cx="3282319" cy="2138093"/>
+          </a:xfrm>
+          <a:prstGeom prst="stripedRightArrow">
+            <a:avLst/>
+          </a:prstGeom>
+          <a:solidFill>
+            <a:schemeClr val="bg1"/>
+          </a:solidFill>
+          <a:ln>
+            <a:solidFill>
+              <a:srgbClr val="FF0000"/>
+            </a:solidFill>
+          </a:ln>
+        </p:spPr>
+        <p:style>
+          <a:lnRef idx="2">
+            <a:schemeClr val="accent1">
+              <a:shade val="50000"/>
+            </a:schemeClr>
+          </a:lnRef>
+          <a:fillRef idx="1">
+            <a:schemeClr val="accent1"/>
+          </a:fillRef>
+          <a:effectRef idx="0">
+            <a:schemeClr val="accent1"/>
+          </a:effectRef>
+          <a:fontRef idx="minor">
+            <a:schemeClr val="lt1"/>
+          </a:fontRef>
+        </p:style>
+        <p:txBody>
+          <a:bodyPr rtlCol="0" anchor="ctr"/>
+          <a:lstStyle/>
+          <a:p>
+            <a:pPr algn="ctr"/>
+            <a:endParaRPr lang="de-DE"/>
+          </a:p>
+        </p:txBody>
+      </p:sp>
+      <p:sp>
+        <p:nvSpPr>
+          <p:cNvPr id="8" name="Rechteck 7"/>
+          <p:cNvSpPr/>
+          <p:nvPr/>
+        </p:nvSpPr>
+        <p:spPr>
+          <a:xfrm>
+            <a:off x="1630828" y="2780907"/>
+            <a:ext cx="311084" cy="245097"/>
+          </a:xfrm>
+          <a:prstGeom prst="rect">
+            <a:avLst/>
+          </a:prstGeom>
+          <a:solidFill>
+            <a:schemeClr val="bg1"/>
+          </a:solidFill>
+        </p:spPr>
+        <p:style>
+          <a:lnRef idx="2">
+            <a:schemeClr val="dk1">
+              <a:shade val="50000"/>
+            </a:schemeClr>
+          </a:lnRef>
+          <a:fillRef idx="1">
+            <a:schemeClr val="dk1"/>
+          </a:fillRef>
+          <a:effectRef idx="0">
+            <a:schemeClr val="dk1"/>
+          </a:effectRef>
+          <a:fontRef idx="minor">
+            <a:schemeClr val="lt1"/>
+          </a:fontRef>
+        </p:style>
+        <p:txBody>
+          <a:bodyPr rtlCol="0" anchor="ctr"/>
+          <a:lstStyle/>
+          <a:p>
+            <a:pPr algn="ctr"/>
+            <a:endParaRPr lang="de-DE"/>
+          </a:p>
+        </p:txBody>
+      </p:sp>
+      <p:sp>
+        <p:nvSpPr>
+          <p:cNvPr id="9" name="Rechteck 8"/>
+          <p:cNvSpPr/>
+          <p:nvPr/>
+        </p:nvSpPr>
+        <p:spPr>
+          <a:xfrm>
+            <a:off x="1630828" y="3235186"/>
+            <a:ext cx="311084" cy="245097"/>
+          </a:xfrm>
+          <a:prstGeom prst="rect">
+            <a:avLst/>
+          </a:prstGeom>
+          <a:solidFill>
+            <a:schemeClr val="bg1"/>
+          </a:solidFill>
+        </p:spPr>
+        <p:style>
+          <a:lnRef idx="2">
+            <a:schemeClr val="dk1">
+              <a:shade val="50000"/>
+            </a:schemeClr>
+          </a:lnRef>
+          <a:fillRef idx="1">
+            <a:schemeClr val="dk1"/>
+          </a:fillRef>
+          <a:effectRef idx="0">
+            <a:schemeClr val="dk1"/>
+          </a:effectRef>
+          <a:fontRef idx="minor">
+            <a:schemeClr val="lt1"/>
+          </a:fontRef>
+        </p:style>
+        <p:txBody>
+          <a:bodyPr rtlCol="0" anchor="ctr"/>
+          <a:lstStyle/>
+          <a:p>
+            <a:pPr algn="ctr"/>
+            <a:endParaRPr lang="de-DE"/>
+          </a:p>
+        </p:txBody>
+      </p:sp>
+      <p:sp>
+        <p:nvSpPr>
+          <p:cNvPr id="10" name="Rechteck 9"/>
+          <p:cNvSpPr/>
+          <p:nvPr/>
+        </p:nvSpPr>
+        <p:spPr>
+          <a:xfrm>
+            <a:off x="1630828" y="3722690"/>
+            <a:ext cx="311084" cy="245097"/>
+          </a:xfrm>
+          <a:prstGeom prst="rect">
+            <a:avLst/>
+          </a:prstGeom>
+          <a:solidFill>
+            <a:schemeClr val="bg1"/>
+          </a:solidFill>
+        </p:spPr>
+        <p:style>
+          <a:lnRef idx="2">
+            <a:schemeClr val="dk1">
+              <a:shade val="50000"/>
+            </a:schemeClr>
+          </a:lnRef>
+          <a:fillRef idx="1">
+            <a:schemeClr val="dk1"/>
+          </a:fillRef>
+          <a:effectRef idx="0">
+            <a:schemeClr val="dk1"/>
+          </a:effectRef>
+          <a:fontRef idx="minor">
+            <a:schemeClr val="lt1"/>
+          </a:fontRef>
+        </p:style>
+        <p:txBody>
+          <a:bodyPr rtlCol="0" anchor="ctr"/>
+          <a:lstStyle/>
+          <a:p>
+            <a:pPr algn="ctr"/>
+            <a:endParaRPr lang="de-DE"/>
+          </a:p>
+        </p:txBody>
+      </p:sp>
+      <p:sp>
+        <p:nvSpPr>
+          <p:cNvPr id="11" name="Rechteck 10"/>
+          <p:cNvSpPr/>
+          <p:nvPr/>
+        </p:nvSpPr>
+        <p:spPr>
+          <a:xfrm>
+            <a:off x="1630828" y="4178314"/>
+            <a:ext cx="311084" cy="245097"/>
+          </a:xfrm>
+          <a:prstGeom prst="rect">
+            <a:avLst/>
+          </a:prstGeom>
+          <a:solidFill>
+            <a:schemeClr val="bg1"/>
+          </a:solidFill>
+        </p:spPr>
+        <p:style>
+          <a:lnRef idx="2">
+            <a:schemeClr val="dk1">
+              <a:shade val="50000"/>
+            </a:schemeClr>
+          </a:lnRef>
+          <a:fillRef idx="1">
+            <a:schemeClr val="dk1"/>
+          </a:fillRef>
+          <a:effectRef idx="0">
+            <a:schemeClr val="dk1"/>
+          </a:effectRef>
+          <a:fontRef idx="minor">
+            <a:schemeClr val="lt1"/>
+          </a:fontRef>
+        </p:style>
+        <p:txBody>
+          <a:bodyPr rtlCol="0" anchor="ctr"/>
+          <a:lstStyle/>
+          <a:p>
+            <a:pPr algn="ctr"/>
+            <a:endParaRPr lang="de-DE"/>
+          </a:p>
+        </p:txBody>
+      </p:sp>
+      <p:sp>
+        <p:nvSpPr>
+          <p:cNvPr id="13" name="Multiplizieren 12"/>
+          <p:cNvSpPr/>
+          <p:nvPr/>
+        </p:nvSpPr>
+        <p:spPr>
+          <a:xfrm>
+            <a:off x="1647324" y="2737589"/>
+            <a:ext cx="278091" cy="331731"/>
+          </a:xfrm>
+          <a:prstGeom prst="mathMultiply">
+            <a:avLst/>
+          </a:prstGeom>
+          <a:solidFill>
+            <a:srgbClr val="FF0000"/>
+          </a:solidFill>
+          <a:ln>
+            <a:solidFill>
+              <a:srgbClr val="FF0000"/>
+            </a:solidFill>
+          </a:ln>
+        </p:spPr>
+        <p:style>
+          <a:lnRef idx="2">
+            <a:schemeClr val="accent1">
+              <a:shade val="50000"/>
+            </a:schemeClr>
+          </a:lnRef>
+          <a:fillRef idx="1">
+            <a:schemeClr val="accent1"/>
+          </a:fillRef>
+          <a:effectRef idx="0">
+            <a:schemeClr val="accent1"/>
+          </a:effectRef>
+          <a:fontRef idx="minor">
+            <a:schemeClr val="lt1"/>
+          </a:fontRef>
+        </p:style>
+        <p:txBody>
+          <a:bodyPr rtlCol="0" anchor="ctr"/>
+          <a:lstStyle/>
+          <a:p>
+            <a:pPr algn="ctr"/>
+            <a:endParaRPr lang="de-DE"/>
+          </a:p>
+        </p:txBody>
+      </p:sp>
+      <p:sp>
+        <p:nvSpPr>
+          <p:cNvPr id="14" name="Multiplizieren 13"/>
+          <p:cNvSpPr/>
+          <p:nvPr/>
+        </p:nvSpPr>
+        <p:spPr>
+          <a:xfrm>
+            <a:off x="1649680" y="3191868"/>
+            <a:ext cx="278091" cy="331731"/>
+          </a:xfrm>
+          <a:prstGeom prst="mathMultiply">
+            <a:avLst/>
+          </a:prstGeom>
+          <a:solidFill>
+            <a:srgbClr val="FF0000"/>
+          </a:solidFill>
+          <a:ln>
+            <a:solidFill>
+              <a:srgbClr val="FF0000"/>
+            </a:solidFill>
+          </a:ln>
+        </p:spPr>
+        <p:style>
+          <a:lnRef idx="2">
+            <a:schemeClr val="accent1">
+              <a:shade val="50000"/>
+            </a:schemeClr>
+          </a:lnRef>
+          <a:fillRef idx="1">
+            <a:schemeClr val="accent1"/>
+          </a:fillRef>
+          <a:effectRef idx="0">
+            <a:schemeClr val="accent1"/>
+          </a:effectRef>
+          <a:fontRef idx="minor">
+            <a:schemeClr val="lt1"/>
+          </a:fontRef>
+        </p:style>
+        <p:txBody>
+          <a:bodyPr rtlCol="0" anchor="ctr"/>
+          <a:lstStyle/>
+          <a:p>
+            <a:pPr algn="ctr"/>
+            <a:endParaRPr lang="de-DE"/>
+          </a:p>
+        </p:txBody>
+      </p:sp>
+      <p:sp>
+        <p:nvSpPr>
+          <p:cNvPr id="15" name="Multiplizieren 14"/>
+          <p:cNvSpPr/>
+          <p:nvPr/>
+        </p:nvSpPr>
+        <p:spPr>
+          <a:xfrm>
+            <a:off x="1663821" y="4134996"/>
+            <a:ext cx="278091" cy="331731"/>
+          </a:xfrm>
+          <a:prstGeom prst="mathMultiply">
+            <a:avLst/>
+          </a:prstGeom>
+          <a:solidFill>
+            <a:srgbClr val="FF0000"/>
+          </a:solidFill>
+          <a:ln>
+            <a:solidFill>
+              <a:srgbClr val="FF0000"/>
+            </a:solidFill>
+          </a:ln>
+        </p:spPr>
+        <p:style>
+          <a:lnRef idx="2">
+            <a:schemeClr val="accent1">
+              <a:shade val="50000"/>
+            </a:schemeClr>
+          </a:lnRef>
+          <a:fillRef idx="1">
+            <a:schemeClr val="accent1"/>
+          </a:fillRef>
+          <a:effectRef idx="0">
+            <a:schemeClr val="accent1"/>
+          </a:effectRef>
+          <a:fontRef idx="minor">
+            <a:schemeClr val="lt1"/>
+          </a:fontRef>
+        </p:style>
+        <p:txBody>
+          <a:bodyPr rtlCol="0" anchor="ctr"/>
+          <a:lstStyle/>
+          <a:p>
+            <a:pPr algn="ctr"/>
+            <a:endParaRPr lang="de-DE"/>
+          </a:p>
+        </p:txBody>
+      </p:sp>
+      <p:sp>
+        <p:nvSpPr>
+          <p:cNvPr id="16" name="Multiplizieren 15"/>
+          <p:cNvSpPr/>
+          <p:nvPr/>
+        </p:nvSpPr>
+        <p:spPr>
+          <a:xfrm>
+            <a:off x="1647324" y="3690810"/>
+            <a:ext cx="278091" cy="331731"/>
+          </a:xfrm>
+          <a:prstGeom prst="mathMultiply">
+            <a:avLst/>
+          </a:prstGeom>
+          <a:solidFill>
+            <a:srgbClr val="FF0000"/>
+          </a:solidFill>
+          <a:ln>
+            <a:solidFill>
+              <a:srgbClr val="FF0000"/>
+            </a:solidFill>
+          </a:ln>
+        </p:spPr>
+        <p:style>
+          <a:lnRef idx="2">
+            <a:schemeClr val="accent1">
+              <a:shade val="50000"/>
+            </a:schemeClr>
+          </a:lnRef>
+          <a:fillRef idx="1">
+            <a:schemeClr val="accent1"/>
+          </a:fillRef>
+          <a:effectRef idx="0">
+            <a:schemeClr val="accent1"/>
+          </a:effectRef>
+          <a:fontRef idx="minor">
+            <a:schemeClr val="lt1"/>
+          </a:fontRef>
+        </p:style>
+        <p:txBody>
+          <a:bodyPr rtlCol="0" anchor="ctr"/>
+          <a:lstStyle/>
+          <a:p>
+            <a:pPr algn="ctr"/>
+            <a:endParaRPr lang="de-DE"/>
+          </a:p>
+        </p:txBody>
+      </p:sp>
+      <p:cxnSp>
+        <p:nvCxnSpPr>
+          <p:cNvPr id="18" name="Gerader Verbinder 17"/>
+          <p:cNvCxnSpPr/>
+          <p:nvPr/>
+        </p:nvCxnSpPr>
+        <p:spPr>
+          <a:xfrm>
+            <a:off x="2187009" y="2903453"/>
+            <a:ext cx="254523" cy="0"/>
+          </a:xfrm>
+          <a:prstGeom prst="line">
+            <a:avLst/>
+          </a:prstGeom>
+        </p:spPr>
+        <p:style>
+          <a:lnRef idx="1">
+            <a:schemeClr val="dk1"/>
+          </a:lnRef>
+          <a:fillRef idx="0">
+            <a:schemeClr val="dk1"/>
+          </a:fillRef>
+          <a:effectRef idx="0">
+            <a:schemeClr val="dk1"/>
+          </a:effectRef>
+          <a:fontRef idx="minor">
+            <a:schemeClr val="tx1"/>
+          </a:fontRef>
+        </p:style>
+      </p:cxnSp>
+      <p:cxnSp>
+        <p:nvCxnSpPr>
+          <p:cNvPr id="21" name="Gerader Verbinder 20"/>
+          <p:cNvCxnSpPr/>
+          <p:nvPr/>
+        </p:nvCxnSpPr>
+        <p:spPr>
+          <a:xfrm>
+            <a:off x="2187009" y="2999292"/>
+            <a:ext cx="254523" cy="0"/>
+          </a:xfrm>
+          <a:prstGeom prst="line">
+            <a:avLst/>
+          </a:prstGeom>
+        </p:spPr>
+        <p:style>
+          <a:lnRef idx="1">
+            <a:schemeClr val="dk1"/>
+          </a:lnRef>
+          <a:fillRef idx="0">
+            <a:schemeClr val="dk1"/>
+          </a:fillRef>
+          <a:effectRef idx="0">
+            <a:schemeClr val="dk1"/>
+          </a:effectRef>
+          <a:fontRef idx="minor">
+            <a:schemeClr val="tx1"/>
+          </a:fontRef>
+        </p:style>
+      </p:cxnSp>
+      <p:cxnSp>
+        <p:nvCxnSpPr>
+          <p:cNvPr id="22" name="Gerader Verbinder 21"/>
+          <p:cNvCxnSpPr/>
+          <p:nvPr/>
+        </p:nvCxnSpPr>
+        <p:spPr>
+          <a:xfrm>
+            <a:off x="2187009" y="3235186"/>
+            <a:ext cx="254523" cy="0"/>
+          </a:xfrm>
+          <a:prstGeom prst="line">
+            <a:avLst/>
+          </a:prstGeom>
+        </p:spPr>
+        <p:style>
+          <a:lnRef idx="1">
+            <a:schemeClr val="dk1"/>
+          </a:lnRef>
+          <a:fillRef idx="0">
+            <a:schemeClr val="dk1"/>
+          </a:fillRef>
+          <a:effectRef idx="0">
+            <a:schemeClr val="dk1"/>
+          </a:effectRef>
+          <a:fontRef idx="minor">
+            <a:schemeClr val="tx1"/>
+          </a:fontRef>
+        </p:style>
+      </p:cxnSp>
+      <p:cxnSp>
+        <p:nvCxnSpPr>
+          <p:cNvPr id="23" name="Gerader Verbinder 22"/>
+          <p:cNvCxnSpPr/>
+          <p:nvPr/>
+        </p:nvCxnSpPr>
+        <p:spPr>
+          <a:xfrm>
+            <a:off x="2187008" y="3357733"/>
+            <a:ext cx="254523" cy="0"/>
+          </a:xfrm>
+          <a:prstGeom prst="line">
+            <a:avLst/>
+          </a:prstGeom>
+        </p:spPr>
+        <p:style>
+          <a:lnRef idx="1">
+            <a:schemeClr val="dk1"/>
+          </a:lnRef>
+          <a:fillRef idx="0">
+            <a:schemeClr val="dk1"/>
+          </a:fillRef>
+          <a:effectRef idx="0">
+            <a:schemeClr val="dk1"/>
+          </a:effectRef>
+          <a:fontRef idx="minor">
+            <a:schemeClr val="tx1"/>
+          </a:fontRef>
+        </p:style>
+      </p:cxnSp>
+      <p:cxnSp>
+        <p:nvCxnSpPr>
+          <p:cNvPr id="24" name="Gerader Verbinder 23"/>
+          <p:cNvCxnSpPr/>
+          <p:nvPr/>
+        </p:nvCxnSpPr>
+        <p:spPr>
+          <a:xfrm>
+            <a:off x="2187008" y="3480283"/>
+            <a:ext cx="254523" cy="0"/>
+          </a:xfrm>
+          <a:prstGeom prst="line">
+            <a:avLst/>
+          </a:prstGeom>
+        </p:spPr>
+        <p:style>
+          <a:lnRef idx="1">
+            <a:schemeClr val="dk1"/>
+          </a:lnRef>
+          <a:fillRef idx="0">
+            <a:schemeClr val="dk1"/>
+          </a:fillRef>
+          <a:effectRef idx="0">
+            <a:schemeClr val="dk1"/>
+          </a:effectRef>
+          <a:fontRef idx="minor">
+            <a:schemeClr val="tx1"/>
+          </a:fontRef>
+        </p:style>
+      </p:cxnSp>
+      <p:cxnSp>
+        <p:nvCxnSpPr>
+          <p:cNvPr id="26" name="Gerader Verbinder 25"/>
+          <p:cNvCxnSpPr/>
+          <p:nvPr/>
+        </p:nvCxnSpPr>
+        <p:spPr>
+          <a:xfrm>
+            <a:off x="2187007" y="4274149"/>
+            <a:ext cx="254523" cy="0"/>
+          </a:xfrm>
+          <a:prstGeom prst="line">
+            <a:avLst/>
+          </a:prstGeom>
+        </p:spPr>
+        <p:style>
+          <a:lnRef idx="1">
+            <a:schemeClr val="dk1"/>
+          </a:lnRef>
+          <a:fillRef idx="0">
+            <a:schemeClr val="dk1"/>
+          </a:fillRef>
+          <a:effectRef idx="0">
+            <a:schemeClr val="dk1"/>
+          </a:effectRef>
+          <a:fontRef idx="minor">
+            <a:schemeClr val="tx1"/>
+          </a:fontRef>
+        </p:style>
+      </p:cxnSp>
+      <p:cxnSp>
+        <p:nvCxnSpPr>
+          <p:cNvPr id="27" name="Gerader Verbinder 26"/>
+          <p:cNvCxnSpPr/>
+          <p:nvPr/>
+        </p:nvCxnSpPr>
+        <p:spPr>
+          <a:xfrm>
+            <a:off x="2187006" y="4178314"/>
+            <a:ext cx="254523" cy="0"/>
+          </a:xfrm>
+          <a:prstGeom prst="line">
+            <a:avLst/>
+          </a:prstGeom>
+        </p:spPr>
+        <p:style>
+          <a:lnRef idx="1">
+            <a:schemeClr val="dk1"/>
+          </a:lnRef>
+          <a:fillRef idx="0">
+            <a:schemeClr val="dk1"/>
+          </a:fillRef>
+          <a:effectRef idx="0">
+            <a:schemeClr val="dk1"/>
+          </a:effectRef>
+          <a:fontRef idx="minor">
+            <a:schemeClr val="tx1"/>
+          </a:fontRef>
+        </p:style>
+      </p:cxnSp>
+      <p:pic>
+        <p:nvPicPr>
+          <p:cNvPr id="2050" name="Picture 2" descr="https://upload.wikimedia.org/wikipedia/commons/thumb/9/92/The_death.png/113px-The_death.png"/>
+          <p:cNvPicPr>
+            <a:picLocks noChangeAspect="1" noChangeArrowheads="1"/>
+          </p:cNvPicPr>
+          <p:nvPr/>
+        </p:nvPicPr>
+        <p:blipFill>
+          <a:blip r:embed="rId2">
+            <a:extLst>
+              <a:ext uri="{28A0092B-C50C-407E-A947-70E740481C1C}">
+                <a14:useLocalDpi xmlns:a14="http://schemas.microsoft.com/office/drawing/2010/main" val="0"/>
+              </a:ext>
+            </a:extLst>
+          </a:blip>
+          <a:srcRect/>
+          <a:stretch>
+            <a:fillRect/>
+          </a:stretch>
+        </p:blipFill>
+        <p:spPr bwMode="auto">
+          <a:xfrm>
+            <a:off x="1827431" y="4745049"/>
+            <a:ext cx="501861" cy="532950"/>
+          </a:xfrm>
+          <a:prstGeom prst="rect">
+            <a:avLst/>
+          </a:prstGeom>
+          <a:noFill/>
+          <a:extLst>
+            <a:ext uri="{909E8E84-426E-40DD-AFC4-6F175D3DCCD1}">
+              <a14:hiddenFill xmlns:a14="http://schemas.microsoft.com/office/drawing/2010/main">
+                <a:solidFill>
+                  <a:srgbClr val="FFFFFF"/>
+                </a:solidFill>
+              </a14:hiddenFill>
+            </a:ext>
+          </a:extLst>
+        </p:spPr>
+      </p:pic>
+      <p:pic>
+        <p:nvPicPr>
+          <p:cNvPr id="28" name="Grafik 27"/>
+          <p:cNvPicPr>
+            <a:picLocks noChangeAspect="1"/>
+          </p:cNvPicPr>
+          <p:nvPr/>
+        </p:nvPicPr>
+        <p:blipFill>
+          <a:blip r:embed="rId3" cstate="print">
+            <a:extLst>
+              <a:ext uri="{28A0092B-C50C-407E-A947-70E740481C1C}">
+                <a14:useLocalDpi xmlns:a14="http://schemas.microsoft.com/office/drawing/2010/main" val="0"/>
+              </a:ext>
+            </a:extLst>
+          </a:blip>
+          <a:stretch>
+            <a:fillRect/>
+          </a:stretch>
+        </p:blipFill>
+        <p:spPr>
+          <a:xfrm>
+            <a:off x="2217534" y="3738293"/>
+            <a:ext cx="186275" cy="274156"/>
+          </a:xfrm>
+          <a:prstGeom prst="rect">
+            <a:avLst/>
+          </a:prstGeom>
+        </p:spPr>
+      </p:pic>
+      <p:sp>
+        <p:nvSpPr>
+          <p:cNvPr id="3" name="Rechteck 2"/>
+          <p:cNvSpPr/>
+          <p:nvPr/>
+        </p:nvSpPr>
+        <p:spPr>
+          <a:xfrm>
+            <a:off x="3365370" y="2020930"/>
+            <a:ext cx="1225485" cy="978362"/>
+          </a:xfrm>
+          <a:prstGeom prst="rect">
+            <a:avLst/>
+          </a:prstGeom>
+        </p:spPr>
+        <p:style>
+          <a:lnRef idx="2">
+            <a:schemeClr val="accent1">
+              <a:shade val="50000"/>
+            </a:schemeClr>
+          </a:lnRef>
+          <a:fillRef idx="1">
+            <a:schemeClr val="accent1"/>
+          </a:fillRef>
+          <a:effectRef idx="0">
+            <a:schemeClr val="accent1"/>
+          </a:effectRef>
+          <a:fontRef idx="minor">
+            <a:schemeClr val="lt1"/>
+          </a:fontRef>
+        </p:style>
+        <p:txBody>
+          <a:bodyPr rtlCol="0" anchor="ctr"/>
+          <a:lstStyle/>
+          <a:p>
+            <a:pPr algn="ctr"/>
+            <a:r>
+              <a:rPr lang="de-DE" dirty="0" smtClean="0"/>
+              <a:t>Chaträume</a:t>
+            </a:r>
+            <a:endParaRPr lang="de-DE" dirty="0"/>
+          </a:p>
+        </p:txBody>
+      </p:sp>
+      <p:sp>
+        <p:nvSpPr>
+          <p:cNvPr id="25" name="Rechteck 24"/>
+          <p:cNvSpPr/>
+          <p:nvPr/>
+        </p:nvSpPr>
+        <p:spPr>
+          <a:xfrm>
+            <a:off x="5990722" y="2032247"/>
+            <a:ext cx="1225485" cy="978362"/>
+          </a:xfrm>
+          <a:prstGeom prst="rect">
+            <a:avLst/>
+          </a:prstGeom>
+        </p:spPr>
+        <p:style>
+          <a:lnRef idx="2">
+            <a:schemeClr val="accent1">
+              <a:shade val="50000"/>
+            </a:schemeClr>
+          </a:lnRef>
+          <a:fillRef idx="1">
+            <a:schemeClr val="accent1"/>
+          </a:fillRef>
+          <a:effectRef idx="0">
+            <a:schemeClr val="accent1"/>
+          </a:effectRef>
+          <a:fontRef idx="minor">
+            <a:schemeClr val="lt1"/>
+          </a:fontRef>
+        </p:style>
+        <p:txBody>
+          <a:bodyPr rtlCol="0" anchor="ctr"/>
+          <a:lstStyle/>
+          <a:p>
+            <a:pPr algn="ctr"/>
+            <a:r>
+              <a:rPr lang="de-DE" dirty="0" smtClean="0"/>
+              <a:t>Server</a:t>
+            </a:r>
+          </a:p>
+          <a:p>
+            <a:pPr algn="ctr"/>
+            <a:r>
+              <a:rPr lang="de-DE" dirty="0" smtClean="0"/>
+              <a:t>Client</a:t>
+            </a:r>
+            <a:endParaRPr lang="de-DE" dirty="0"/>
+          </a:p>
+        </p:txBody>
+      </p:sp>
+      <p:sp>
+        <p:nvSpPr>
+          <p:cNvPr id="4" name="Pfeil nach rechts 3"/>
+          <p:cNvSpPr/>
+          <p:nvPr/>
+        </p:nvSpPr>
+        <p:spPr>
+          <a:xfrm>
+            <a:off x="4742670" y="2267795"/>
+            <a:ext cx="978408" cy="484632"/>
+          </a:xfrm>
+          <a:prstGeom prst="rightArrow">
+            <a:avLst/>
+          </a:prstGeom>
+        </p:spPr>
+        <p:style>
+          <a:lnRef idx="2">
+            <a:schemeClr val="accent1">
+              <a:shade val="50000"/>
+            </a:schemeClr>
+          </a:lnRef>
+          <a:fillRef idx="1">
+            <a:schemeClr val="accent1"/>
+          </a:fillRef>
+          <a:effectRef idx="0">
+            <a:schemeClr val="accent1"/>
+          </a:effectRef>
+          <a:fontRef idx="minor">
+            <a:schemeClr val="lt1"/>
+          </a:fontRef>
+        </p:style>
+        <p:txBody>
+          <a:bodyPr rtlCol="0" anchor="ctr"/>
+          <a:lstStyle/>
+          <a:p>
+            <a:pPr algn="ctr"/>
+            <a:endParaRPr lang="de-DE"/>
+          </a:p>
+        </p:txBody>
+      </p:sp>
+      <p:sp>
+        <p:nvSpPr>
+          <p:cNvPr id="5" name="Pfeil nach rechts 4"/>
+          <p:cNvSpPr/>
+          <p:nvPr/>
+        </p:nvSpPr>
+        <p:spPr>
+          <a:xfrm rot="2576998">
+            <a:off x="5591084" y="5279894"/>
+            <a:ext cx="978408" cy="484632"/>
+          </a:xfrm>
+          <a:prstGeom prst="rightArrow">
+            <a:avLst/>
+          </a:prstGeom>
+        </p:spPr>
+        <p:style>
+          <a:lnRef idx="2">
+            <a:schemeClr val="accent1">
+              <a:shade val="50000"/>
+            </a:schemeClr>
+          </a:lnRef>
+          <a:fillRef idx="1">
+            <a:schemeClr val="accent1"/>
+          </a:fillRef>
+          <a:effectRef idx="0">
+            <a:schemeClr val="accent1"/>
+          </a:effectRef>
+          <a:fontRef idx="minor">
+            <a:schemeClr val="lt1"/>
+          </a:fontRef>
+        </p:style>
+        <p:txBody>
+          <a:bodyPr rtlCol="0" anchor="ctr"/>
+          <a:lstStyle/>
+          <a:p>
+            <a:pPr algn="ctr"/>
+            <a:endParaRPr lang="de-DE"/>
+          </a:p>
+        </p:txBody>
+      </p:sp>
+      <p:sp>
+        <p:nvSpPr>
+          <p:cNvPr id="32" name="Rechteck 31"/>
+          <p:cNvSpPr/>
+          <p:nvPr/>
+        </p:nvSpPr>
+        <p:spPr>
+          <a:xfrm>
+            <a:off x="4590853" y="3784968"/>
+            <a:ext cx="1225485" cy="978362"/>
+          </a:xfrm>
+          <a:prstGeom prst="rect">
+            <a:avLst/>
+          </a:prstGeom>
+        </p:spPr>
+        <p:style>
+          <a:lnRef idx="2">
+            <a:schemeClr val="accent1">
+              <a:shade val="50000"/>
+            </a:schemeClr>
+          </a:lnRef>
+          <a:fillRef idx="1">
+            <a:schemeClr val="accent1"/>
+          </a:fillRef>
+          <a:effectRef idx="0">
+            <a:schemeClr val="accent1"/>
+          </a:effectRef>
+          <a:fontRef idx="minor">
+            <a:schemeClr val="lt1"/>
+          </a:fontRef>
+        </p:style>
+        <p:txBody>
+          <a:bodyPr rtlCol="0" anchor="ctr"/>
+          <a:lstStyle/>
+          <a:p>
+            <a:pPr algn="ctr"/>
+            <a:r>
+              <a:rPr lang="de-DE" dirty="0" smtClean="0"/>
+              <a:t>Chaträume</a:t>
+            </a:r>
+            <a:endParaRPr lang="de-DE" dirty="0"/>
+          </a:p>
+        </p:txBody>
+      </p:sp>
+      <p:sp>
+        <p:nvSpPr>
+          <p:cNvPr id="33" name="Rechteck 32"/>
+          <p:cNvSpPr/>
+          <p:nvPr/>
+        </p:nvSpPr>
+        <p:spPr>
+          <a:xfrm>
+            <a:off x="7041821" y="3784968"/>
+            <a:ext cx="1225485" cy="978362"/>
+          </a:xfrm>
+          <a:prstGeom prst="rect">
+            <a:avLst/>
+          </a:prstGeom>
+        </p:spPr>
+        <p:style>
+          <a:lnRef idx="2">
+            <a:schemeClr val="accent1">
+              <a:shade val="50000"/>
+            </a:schemeClr>
+          </a:lnRef>
+          <a:fillRef idx="1">
+            <a:schemeClr val="accent1"/>
+          </a:fillRef>
+          <a:effectRef idx="0">
+            <a:schemeClr val="accent1"/>
+          </a:effectRef>
+          <a:fontRef idx="minor">
+            <a:schemeClr val="lt1"/>
+          </a:fontRef>
+        </p:style>
+        <p:txBody>
+          <a:bodyPr rtlCol="0" anchor="ctr"/>
+          <a:lstStyle/>
+          <a:p>
+            <a:pPr algn="ctr"/>
+            <a:r>
+              <a:rPr lang="de-DE" dirty="0" smtClean="0"/>
+              <a:t>Server</a:t>
+            </a:r>
+          </a:p>
+        </p:txBody>
+      </p:sp>
+      <p:sp>
+        <p:nvSpPr>
+          <p:cNvPr id="34" name="Rechteck 33"/>
+          <p:cNvSpPr/>
+          <p:nvPr/>
+        </p:nvSpPr>
+        <p:spPr>
+          <a:xfrm>
+            <a:off x="7041821" y="5397980"/>
+            <a:ext cx="1225485" cy="978362"/>
+          </a:xfrm>
+          <a:prstGeom prst="rect">
+            <a:avLst/>
+          </a:prstGeom>
+        </p:spPr>
+        <p:style>
+          <a:lnRef idx="2">
+            <a:schemeClr val="accent1">
+              <a:shade val="50000"/>
+            </a:schemeClr>
+          </a:lnRef>
+          <a:fillRef idx="1">
+            <a:schemeClr val="accent1"/>
+          </a:fillRef>
+          <a:effectRef idx="0">
+            <a:schemeClr val="accent1"/>
+          </a:effectRef>
+          <a:fontRef idx="minor">
+            <a:schemeClr val="lt1"/>
+          </a:fontRef>
+        </p:style>
+        <p:txBody>
+          <a:bodyPr rtlCol="0" anchor="ctr"/>
+          <a:lstStyle/>
+          <a:p>
+            <a:pPr algn="ctr"/>
+            <a:r>
+              <a:rPr lang="de-DE" dirty="0" smtClean="0"/>
+              <a:t>Client</a:t>
+            </a:r>
+            <a:endParaRPr lang="de-DE" dirty="0"/>
+          </a:p>
+        </p:txBody>
+      </p:sp>
+      <p:sp>
+        <p:nvSpPr>
+          <p:cNvPr id="35" name="Pfeil nach rechts 34"/>
+          <p:cNvSpPr/>
+          <p:nvPr/>
+        </p:nvSpPr>
+        <p:spPr>
+          <a:xfrm>
+            <a:off x="5939875" y="3677812"/>
+            <a:ext cx="978408" cy="484632"/>
+          </a:xfrm>
+          <a:prstGeom prst="rightArrow">
+            <a:avLst/>
+          </a:prstGeom>
+        </p:spPr>
+        <p:style>
+          <a:lnRef idx="2">
+            <a:schemeClr val="accent1">
+              <a:shade val="50000"/>
+            </a:schemeClr>
+          </a:lnRef>
+          <a:fillRef idx="1">
+            <a:schemeClr val="accent1"/>
+          </a:fillRef>
+          <a:effectRef idx="0">
+            <a:schemeClr val="accent1"/>
+          </a:effectRef>
+          <a:fontRef idx="minor">
+            <a:schemeClr val="lt1"/>
+          </a:fontRef>
+        </p:style>
+        <p:txBody>
+          <a:bodyPr rtlCol="0" anchor="ctr"/>
+          <a:lstStyle/>
+          <a:p>
+            <a:pPr algn="ctr"/>
+            <a:endParaRPr lang="de-DE"/>
+          </a:p>
+        </p:txBody>
+      </p:sp>
+      <p:sp>
+        <p:nvSpPr>
+          <p:cNvPr id="36" name="Pfeil nach rechts 35"/>
+          <p:cNvSpPr/>
+          <p:nvPr/>
+        </p:nvSpPr>
+        <p:spPr>
+          <a:xfrm rot="5400000">
+            <a:off x="7240276" y="4877427"/>
+            <a:ext cx="978408" cy="484632"/>
+          </a:xfrm>
+          <a:prstGeom prst="rightArrow">
+            <a:avLst/>
+          </a:prstGeom>
+        </p:spPr>
+        <p:style>
+          <a:lnRef idx="2">
+            <a:schemeClr val="accent1">
+              <a:shade val="50000"/>
+            </a:schemeClr>
+          </a:lnRef>
+          <a:fillRef idx="1">
+            <a:schemeClr val="accent1"/>
+          </a:fillRef>
+          <a:effectRef idx="0">
+            <a:schemeClr val="accent1"/>
+          </a:effectRef>
+          <a:fontRef idx="minor">
+            <a:schemeClr val="lt1"/>
+          </a:fontRef>
+        </p:style>
+        <p:txBody>
+          <a:bodyPr rtlCol="0" anchor="ctr"/>
+          <a:lstStyle/>
+          <a:p>
+            <a:pPr algn="ctr"/>
+            <a:endParaRPr lang="de-DE"/>
+          </a:p>
+        </p:txBody>
+      </p:sp>
+      <p:sp>
+        <p:nvSpPr>
+          <p:cNvPr id="37" name="Pfeil nach rechts 36"/>
+          <p:cNvSpPr/>
+          <p:nvPr/>
+        </p:nvSpPr>
+        <p:spPr>
+          <a:xfrm rot="10800000">
+            <a:off x="5939875" y="4300861"/>
+            <a:ext cx="978408" cy="484632"/>
+          </a:xfrm>
+          <a:prstGeom prst="rightArrow">
+            <a:avLst/>
+          </a:prstGeom>
+        </p:spPr>
+        <p:style>
+          <a:lnRef idx="2">
+            <a:schemeClr val="accent1">
+              <a:shade val="50000"/>
+            </a:schemeClr>
+          </a:lnRef>
+          <a:fillRef idx="1">
+            <a:schemeClr val="accent1"/>
+          </a:fillRef>
+          <a:effectRef idx="0">
+            <a:schemeClr val="accent1"/>
+          </a:effectRef>
+          <a:fontRef idx="minor">
+            <a:schemeClr val="lt1"/>
+          </a:fontRef>
+        </p:style>
+        <p:txBody>
+          <a:bodyPr rtlCol="0" anchor="ctr"/>
+          <a:lstStyle/>
+          <a:p>
+            <a:pPr algn="ctr"/>
+            <a:endParaRPr lang="de-DE"/>
+          </a:p>
+        </p:txBody>
+      </p:sp>
+    </p:spTree>
+    <p:extLst>
+      <p:ext uri="{BB962C8B-B14F-4D97-AF65-F5344CB8AC3E}">
+        <p14:creationId xmlns:p14="http://schemas.microsoft.com/office/powerpoint/2010/main" val="3629875903"/>
+      </p:ext>
+    </p:extLst>
+  </p:cSld>
+  <p:clrMapOvr>
+    <a:masterClrMapping/>
+  </p:clrMapOvr>
+  <p:timing>
+    <p:tnLst>
+      <p:par>
+        <p:cTn id="1" dur="indefinite" restart="never" nodeType="tmRoot"/>
+      </p:par>
+    </p:tnLst>
+  </p:timing>
+</p:sld>
+</file>
+
 <file path=ppt/slides/slide2.xml><?xml version="1.0" encoding="utf-8"?>
 <p:sld xmlns:a="http://schemas.openxmlformats.org/drawingml/2006/main" xmlns:r="http://schemas.openxmlformats.org/officeDocument/2006/relationships" xmlns:p="http://schemas.openxmlformats.org/presentationml/2006/main">
   <p:cSld>
@@ -1527,8 +3287,16 @@
           <a:p>
             <a:r>
               <a:rPr lang="de-DE" dirty="0" smtClean="0"/>
-              <a:t>Projektidee und Vorgehen</a:t>
-            </a:r>
+              <a:t>Projektidee </a:t>
+            </a:r>
+            <a:endParaRPr lang="de-DE" dirty="0"/>
+          </a:p>
+          <a:p>
+            <a:r>
+              <a:rPr lang="de-DE" dirty="0" smtClean="0"/>
+              <a:t>Vorgehen</a:t>
+            </a:r>
+            <a:endParaRPr lang="de-DE" dirty="0" smtClean="0"/>
           </a:p>
           <a:p>
             <a:r>
@@ -1547,6 +3315,13 @@
               <a:rPr lang="de-DE" dirty="0" smtClean="0"/>
               <a:t>Anwendungspräsentation</a:t>
             </a:r>
+          </a:p>
+          <a:p>
+            <a:r>
+              <a:rPr lang="de-DE" dirty="0" smtClean="0"/>
+              <a:t>Erweiterbarkeit</a:t>
+            </a:r>
+            <a:endParaRPr lang="de-DE" dirty="0" smtClean="0"/>
           </a:p>
           <a:p>
             <a:r>
@@ -1567,6 +3342,2549 @@
   <p:clrMapOvr>
     <a:masterClrMapping/>
   </p:clrMapOvr>
+</p:sld>
+</file>
+
+<file path=ppt/slides/slide3.xml><?xml version="1.0" encoding="utf-8"?>
+<p:sld xmlns:a="http://schemas.openxmlformats.org/drawingml/2006/main" xmlns:r="http://schemas.openxmlformats.org/officeDocument/2006/relationships" xmlns:p="http://schemas.openxmlformats.org/presentationml/2006/main">
+  <p:cSld>
+    <p:spTree>
+      <p:nvGrpSpPr>
+        <p:cNvPr id="1" name=""/>
+        <p:cNvGrpSpPr/>
+        <p:nvPr/>
+      </p:nvGrpSpPr>
+      <p:grpSpPr>
+        <a:xfrm>
+          <a:off x="0" y="0"/>
+          <a:ext cx="0" cy="0"/>
+          <a:chOff x="0" y="0"/>
+          <a:chExt cx="0" cy="0"/>
+        </a:xfrm>
+      </p:grpSpPr>
+      <p:sp>
+        <p:nvSpPr>
+          <p:cNvPr id="2" name="Titel 1"/>
+          <p:cNvSpPr>
+            <a:spLocks noGrp="1"/>
+          </p:cNvSpPr>
+          <p:nvPr>
+            <p:ph type="title"/>
+          </p:nvPr>
+        </p:nvSpPr>
+        <p:spPr>
+          <a:xfrm>
+            <a:off x="360000" y="1317222"/>
+            <a:ext cx="8246118" cy="569556"/>
+          </a:xfrm>
+        </p:spPr>
+        <p:txBody>
+          <a:bodyPr/>
+          <a:lstStyle/>
+          <a:p>
+            <a:r>
+              <a:rPr lang="de-DE" dirty="0" smtClean="0"/>
+              <a:t>Projektidee</a:t>
+            </a:r>
+            <a:endParaRPr lang="de-DE" dirty="0"/>
+          </a:p>
+        </p:txBody>
+      </p:sp>
+      <p:pic>
+        <p:nvPicPr>
+          <p:cNvPr id="1026" name="Picture 2" descr="https://bestwinsoft.com/images/ICQ_1.png"/>
+          <p:cNvPicPr>
+            <a:picLocks noChangeAspect="1" noChangeArrowheads="1"/>
+          </p:cNvPicPr>
+          <p:nvPr/>
+        </p:nvPicPr>
+        <p:blipFill>
+          <a:blip r:embed="rId5">
+            <a:extLst>
+              <a:ext uri="{28A0092B-C50C-407E-A947-70E740481C1C}">
+                <a14:useLocalDpi xmlns:a14="http://schemas.microsoft.com/office/drawing/2010/main" val="0"/>
+              </a:ext>
+            </a:extLst>
+          </a:blip>
+          <a:srcRect/>
+          <a:stretch>
+            <a:fillRect/>
+          </a:stretch>
+        </p:blipFill>
+        <p:spPr bwMode="auto">
+          <a:xfrm>
+            <a:off x="1868965" y="2020852"/>
+            <a:ext cx="5437357" cy="3843273"/>
+          </a:xfrm>
+          <a:prstGeom prst="rect">
+            <a:avLst/>
+          </a:prstGeom>
+          <a:noFill/>
+          <a:extLst>
+            <a:ext uri="{909E8E84-426E-40DD-AFC4-6F175D3DCCD1}">
+              <a14:hiddenFill xmlns:a14="http://schemas.microsoft.com/office/drawing/2010/main">
+                <a:solidFill>
+                  <a:srgbClr val="FFFFFF"/>
+                </a:solidFill>
+              </a14:hiddenFill>
+            </a:ext>
+          </a:extLst>
+        </p:spPr>
+      </p:pic>
+      <p:pic>
+        <p:nvPicPr>
+          <p:cNvPr id="4" name="icq - sms">
+            <a:hlinkClick r:id="" action="ppaction://media"/>
+          </p:cNvPr>
+          <p:cNvPicPr>
+            <a:picLocks noChangeAspect="1"/>
+          </p:cNvPicPr>
+          <p:nvPr>
+            <a:audioFile r:link="rId2"/>
+            <p:extLst>
+              <p:ext uri="{DAA4B4D4-6D71-4841-9C94-3DE7FCFB9230}">
+                <p14:media xmlns:p14="http://schemas.microsoft.com/office/powerpoint/2010/main" r:embed="rId1"/>
+              </p:ext>
+            </p:extLst>
+          </p:nvPr>
+        </p:nvPicPr>
+        <p:blipFill>
+          <a:blip r:embed="rId6"/>
+          <a:stretch>
+            <a:fillRect/>
+          </a:stretch>
+        </p:blipFill>
+        <p:spPr>
+          <a:xfrm>
+            <a:off x="7680106" y="5620444"/>
+            <a:ext cx="487362" cy="487362"/>
+          </a:xfrm>
+          <a:prstGeom prst="rect">
+            <a:avLst/>
+          </a:prstGeom>
+        </p:spPr>
+      </p:pic>
+    </p:spTree>
+    <p:extLst>
+      <p:ext uri="{BB962C8B-B14F-4D97-AF65-F5344CB8AC3E}">
+        <p14:creationId xmlns:p14="http://schemas.microsoft.com/office/powerpoint/2010/main" val="65982326"/>
+      </p:ext>
+    </p:extLst>
+  </p:cSld>
+  <p:clrMapOvr>
+    <a:masterClrMapping/>
+  </p:clrMapOvr>
+  <p:timing>
+    <p:tnLst>
+      <p:par>
+        <p:cTn id="1" dur="indefinite" restart="never" nodeType="tmRoot">
+          <p:childTnLst>
+            <p:seq concurrent="1" nextAc="seek">
+              <p:cTn id="2" restart="whenNotActive" fill="hold" evtFilter="cancelBubble" nodeType="interactiveSeq">
+                <p:stCondLst>
+                  <p:cond evt="onClick" delay="0">
+                    <p:tgtEl>
+                      <p:spTgt spid="4"/>
+                    </p:tgtEl>
+                  </p:cond>
+                </p:stCondLst>
+                <p:endSync evt="end" delay="0">
+                  <p:rtn val="all"/>
+                </p:endSync>
+                <p:childTnLst>
+                  <p:par>
+                    <p:cTn id="3" fill="hold">
+                      <p:stCondLst>
+                        <p:cond delay="0"/>
+                      </p:stCondLst>
+                      <p:childTnLst>
+                        <p:par>
+                          <p:cTn id="4" fill="hold">
+                            <p:stCondLst>
+                              <p:cond delay="0"/>
+                            </p:stCondLst>
+                            <p:childTnLst>
+                              <p:par>
+                                <p:cTn id="5" presetID="1" presetClass="mediacall" presetSubtype="0" fill="hold" nodeType="clickEffect">
+                                  <p:stCondLst>
+                                    <p:cond delay="0"/>
+                                  </p:stCondLst>
+                                  <p:childTnLst>
+                                    <p:cmd type="call" cmd="playFrom(0.0)">
+                                      <p:cBhvr>
+                                        <p:cTn id="6" dur="1724" fill="hold"/>
+                                        <p:tgtEl>
+                                          <p:spTgt spid="4"/>
+                                        </p:tgtEl>
+                                      </p:cBhvr>
+                                    </p:cmd>
+                                  </p:childTnLst>
+                                </p:cTn>
+                              </p:par>
+                            </p:childTnLst>
+                          </p:cTn>
+                        </p:par>
+                      </p:childTnLst>
+                    </p:cTn>
+                  </p:par>
+                </p:childTnLst>
+              </p:cTn>
+              <p:nextCondLst>
+                <p:cond evt="onClick" delay="0">
+                  <p:tgtEl>
+                    <p:spTgt spid="4"/>
+                  </p:tgtEl>
+                </p:cond>
+              </p:nextCondLst>
+            </p:seq>
+            <p:audio>
+              <p:cMediaNode vol="100000">
+                <p:cTn id="7" fill="hold" display="0">
+                  <p:stCondLst>
+                    <p:cond delay="indefinite"/>
+                  </p:stCondLst>
+                  <p:endCondLst>
+                    <p:cond evt="onStopAudio" delay="0">
+                      <p:tgtEl>
+                        <p:sldTgt/>
+                      </p:tgtEl>
+                    </p:cond>
+                  </p:endCondLst>
+                </p:cTn>
+                <p:tgtEl>
+                  <p:spTgt spid="4"/>
+                </p:tgtEl>
+              </p:cMediaNode>
+            </p:audio>
+          </p:childTnLst>
+        </p:cTn>
+      </p:par>
+    </p:tnLst>
+  </p:timing>
+</p:sld>
+</file>
+
+<file path=ppt/slides/slide4.xml><?xml version="1.0" encoding="utf-8"?>
+<p:sld xmlns:a="http://schemas.openxmlformats.org/drawingml/2006/main" xmlns:r="http://schemas.openxmlformats.org/officeDocument/2006/relationships" xmlns:p="http://schemas.openxmlformats.org/presentationml/2006/main">
+  <p:cSld>
+    <p:spTree>
+      <p:nvGrpSpPr>
+        <p:cNvPr id="1" name=""/>
+        <p:cNvGrpSpPr/>
+        <p:nvPr/>
+      </p:nvGrpSpPr>
+      <p:grpSpPr>
+        <a:xfrm>
+          <a:off x="0" y="0"/>
+          <a:ext cx="0" cy="0"/>
+          <a:chOff x="0" y="0"/>
+          <a:chExt cx="0" cy="0"/>
+        </a:xfrm>
+      </p:grpSpPr>
+      <p:sp>
+        <p:nvSpPr>
+          <p:cNvPr id="2" name="Titel 1"/>
+          <p:cNvSpPr>
+            <a:spLocks noGrp="1"/>
+          </p:cNvSpPr>
+          <p:nvPr>
+            <p:ph type="title"/>
+          </p:nvPr>
+        </p:nvSpPr>
+        <p:spPr>
+          <a:xfrm>
+            <a:off x="360000" y="1317222"/>
+            <a:ext cx="8246118" cy="569556"/>
+          </a:xfrm>
+        </p:spPr>
+        <p:txBody>
+          <a:bodyPr/>
+          <a:lstStyle/>
+          <a:p>
+            <a:r>
+              <a:rPr lang="de-DE" dirty="0" smtClean="0"/>
+              <a:t>Vorgehen</a:t>
+            </a:r>
+            <a:endParaRPr lang="de-DE" dirty="0"/>
+          </a:p>
+        </p:txBody>
+      </p:sp>
+      <p:sp>
+        <p:nvSpPr>
+          <p:cNvPr id="3" name="Inhaltsplatzhalter 2"/>
+          <p:cNvSpPr>
+            <a:spLocks noGrp="1"/>
+          </p:cNvSpPr>
+          <p:nvPr>
+            <p:ph idx="1"/>
+          </p:nvPr>
+        </p:nvSpPr>
+        <p:spPr/>
+        <p:txBody>
+          <a:bodyPr/>
+          <a:lstStyle/>
+          <a:p>
+            <a:r>
+              <a:rPr lang="de-DE" dirty="0" smtClean="0"/>
+              <a:t>Fällt </a:t>
+            </a:r>
+            <a:r>
+              <a:rPr lang="de-DE" dirty="0" err="1" smtClean="0"/>
+              <a:t>evtl</a:t>
+            </a:r>
+            <a:r>
+              <a:rPr lang="de-DE" dirty="0" smtClean="0"/>
+              <a:t> raus, diskutierbar.</a:t>
+            </a:r>
+          </a:p>
+          <a:p>
+            <a:r>
+              <a:rPr lang="de-DE" dirty="0" smtClean="0"/>
+              <a:t>Was sollte rein?</a:t>
+            </a:r>
+          </a:p>
+        </p:txBody>
+      </p:sp>
+    </p:spTree>
+    <p:extLst>
+      <p:ext uri="{BB962C8B-B14F-4D97-AF65-F5344CB8AC3E}">
+        <p14:creationId xmlns:p14="http://schemas.microsoft.com/office/powerpoint/2010/main" val="3150950865"/>
+      </p:ext>
+    </p:extLst>
+  </p:cSld>
+  <p:clrMapOvr>
+    <a:masterClrMapping/>
+  </p:clrMapOvr>
+</p:sld>
+</file>
+
+<file path=ppt/slides/slide5.xml><?xml version="1.0" encoding="utf-8"?>
+<p:sld xmlns:a="http://schemas.openxmlformats.org/drawingml/2006/main" xmlns:r="http://schemas.openxmlformats.org/officeDocument/2006/relationships" xmlns:p="http://schemas.openxmlformats.org/presentationml/2006/main">
+  <p:cSld>
+    <p:spTree>
+      <p:nvGrpSpPr>
+        <p:cNvPr id="1" name=""/>
+        <p:cNvGrpSpPr/>
+        <p:nvPr/>
+      </p:nvGrpSpPr>
+      <p:grpSpPr>
+        <a:xfrm>
+          <a:off x="0" y="0"/>
+          <a:ext cx="0" cy="0"/>
+          <a:chOff x="0" y="0"/>
+          <a:chExt cx="0" cy="0"/>
+        </a:xfrm>
+      </p:grpSpPr>
+      <p:sp>
+        <p:nvSpPr>
+          <p:cNvPr id="2" name="Titel 1"/>
+          <p:cNvSpPr>
+            <a:spLocks noGrp="1"/>
+          </p:cNvSpPr>
+          <p:nvPr>
+            <p:ph type="title"/>
+          </p:nvPr>
+        </p:nvSpPr>
+        <p:spPr>
+          <a:xfrm>
+            <a:off x="360000" y="1317222"/>
+            <a:ext cx="8246118" cy="569556"/>
+          </a:xfrm>
+        </p:spPr>
+        <p:txBody>
+          <a:bodyPr/>
+          <a:lstStyle/>
+          <a:p>
+            <a:r>
+              <a:rPr lang="de-DE" dirty="0" smtClean="0"/>
+              <a:t>Kommunikationsprotokoll</a:t>
+            </a:r>
+            <a:endParaRPr lang="de-DE" dirty="0"/>
+          </a:p>
+        </p:txBody>
+      </p:sp>
+      <p:sp>
+        <p:nvSpPr>
+          <p:cNvPr id="3" name="Inhaltsplatzhalter 2"/>
+          <p:cNvSpPr>
+            <a:spLocks noGrp="1"/>
+          </p:cNvSpPr>
+          <p:nvPr>
+            <p:ph idx="1"/>
+          </p:nvPr>
+        </p:nvSpPr>
+        <p:spPr/>
+        <p:txBody>
+          <a:bodyPr/>
+          <a:lstStyle/>
+          <a:p>
+            <a:r>
+              <a:rPr lang="de-DE" dirty="0" smtClean="0"/>
+              <a:t>Allgemeines</a:t>
+            </a:r>
+          </a:p>
+          <a:p>
+            <a:r>
+              <a:rPr lang="de-DE" dirty="0" smtClean="0"/>
+              <a:t>Grundlegende Funktionsweise</a:t>
+            </a:r>
+          </a:p>
+          <a:p>
+            <a:r>
+              <a:rPr lang="de-DE" dirty="0" smtClean="0"/>
+              <a:t>Welche Typen? Welche Funktion?</a:t>
+            </a:r>
+          </a:p>
+          <a:p>
+            <a:r>
+              <a:rPr lang="de-DE" dirty="0" smtClean="0"/>
+              <a:t>Trennzeichen, Endzeichen</a:t>
+            </a:r>
+          </a:p>
+          <a:p>
+            <a:r>
+              <a:rPr lang="de-DE" dirty="0" smtClean="0"/>
+              <a:t>Beispielhafter Ablauf zur Demo</a:t>
+            </a:r>
+            <a:endParaRPr lang="de-DE" dirty="0"/>
+          </a:p>
+        </p:txBody>
+      </p:sp>
+    </p:spTree>
+    <p:extLst>
+      <p:ext uri="{BB962C8B-B14F-4D97-AF65-F5344CB8AC3E}">
+        <p14:creationId xmlns:p14="http://schemas.microsoft.com/office/powerpoint/2010/main" val="752607744"/>
+      </p:ext>
+    </p:extLst>
+  </p:cSld>
+  <p:clrMapOvr>
+    <a:masterClrMapping/>
+  </p:clrMapOvr>
+</p:sld>
+</file>
+
+<file path=ppt/slides/slide6.xml><?xml version="1.0" encoding="utf-8"?>
+<p:sld xmlns:a="http://schemas.openxmlformats.org/drawingml/2006/main" xmlns:r="http://schemas.openxmlformats.org/officeDocument/2006/relationships" xmlns:p="http://schemas.openxmlformats.org/presentationml/2006/main">
+  <p:cSld>
+    <p:spTree>
+      <p:nvGrpSpPr>
+        <p:cNvPr id="1" name=""/>
+        <p:cNvGrpSpPr/>
+        <p:nvPr/>
+      </p:nvGrpSpPr>
+      <p:grpSpPr>
+        <a:xfrm>
+          <a:off x="0" y="0"/>
+          <a:ext cx="0" cy="0"/>
+          <a:chOff x="0" y="0"/>
+          <a:chExt cx="0" cy="0"/>
+        </a:xfrm>
+      </p:grpSpPr>
+      <p:sp>
+        <p:nvSpPr>
+          <p:cNvPr id="2" name="Titel 1"/>
+          <p:cNvSpPr>
+            <a:spLocks noGrp="1"/>
+          </p:cNvSpPr>
+          <p:nvPr>
+            <p:ph type="title"/>
+          </p:nvPr>
+        </p:nvSpPr>
+        <p:spPr>
+          <a:xfrm>
+            <a:off x="360000" y="1317222"/>
+            <a:ext cx="8246118" cy="569556"/>
+          </a:xfrm>
+        </p:spPr>
+        <p:txBody>
+          <a:bodyPr/>
+          <a:lstStyle/>
+          <a:p>
+            <a:r>
+              <a:rPr lang="de-DE" dirty="0" smtClean="0"/>
+              <a:t>Implementierungslogik – anderes Wort finden</a:t>
+            </a:r>
+            <a:endParaRPr lang="de-DE" dirty="0"/>
+          </a:p>
+        </p:txBody>
+      </p:sp>
+      <p:sp>
+        <p:nvSpPr>
+          <p:cNvPr id="3" name="Inhaltsplatzhalter 2"/>
+          <p:cNvSpPr>
+            <a:spLocks noGrp="1"/>
+          </p:cNvSpPr>
+          <p:nvPr>
+            <p:ph idx="1"/>
+          </p:nvPr>
+        </p:nvSpPr>
+        <p:spPr/>
+        <p:txBody>
+          <a:bodyPr/>
+          <a:lstStyle/>
+          <a:p>
+            <a:r>
+              <a:rPr lang="de-DE" dirty="0" smtClean="0"/>
+              <a:t>Bild Server, frei dazu reden</a:t>
+            </a:r>
+          </a:p>
+          <a:p>
+            <a:r>
+              <a:rPr lang="de-DE" dirty="0" smtClean="0"/>
+              <a:t>Client analog</a:t>
+            </a:r>
+            <a:endParaRPr lang="de-DE" dirty="0"/>
+          </a:p>
+        </p:txBody>
+      </p:sp>
+    </p:spTree>
+    <p:extLst>
+      <p:ext uri="{BB962C8B-B14F-4D97-AF65-F5344CB8AC3E}">
+        <p14:creationId xmlns:p14="http://schemas.microsoft.com/office/powerpoint/2010/main" val="2694720648"/>
+      </p:ext>
+    </p:extLst>
+  </p:cSld>
+  <p:clrMapOvr>
+    <a:masterClrMapping/>
+  </p:clrMapOvr>
+</p:sld>
+</file>
+
+<file path=ppt/slides/slide7.xml><?xml version="1.0" encoding="utf-8"?>
+<p:sld xmlns:a="http://schemas.openxmlformats.org/drawingml/2006/main" xmlns:r="http://schemas.openxmlformats.org/officeDocument/2006/relationships" xmlns:p="http://schemas.openxmlformats.org/presentationml/2006/main">
+  <p:cSld>
+    <p:spTree>
+      <p:nvGrpSpPr>
+        <p:cNvPr id="1" name=""/>
+        <p:cNvGrpSpPr/>
+        <p:nvPr/>
+      </p:nvGrpSpPr>
+      <p:grpSpPr>
+        <a:xfrm>
+          <a:off x="0" y="0"/>
+          <a:ext cx="0" cy="0"/>
+          <a:chOff x="0" y="0"/>
+          <a:chExt cx="0" cy="0"/>
+        </a:xfrm>
+      </p:grpSpPr>
+      <p:sp>
+        <p:nvSpPr>
+          <p:cNvPr id="2" name="Titel 1"/>
+          <p:cNvSpPr>
+            <a:spLocks noGrp="1"/>
+          </p:cNvSpPr>
+          <p:nvPr>
+            <p:ph type="title"/>
+          </p:nvPr>
+        </p:nvSpPr>
+        <p:spPr>
+          <a:xfrm>
+            <a:off x="360000" y="1317222"/>
+            <a:ext cx="8246118" cy="569556"/>
+          </a:xfrm>
+        </p:spPr>
+        <p:txBody>
+          <a:bodyPr/>
+          <a:lstStyle/>
+          <a:p>
+            <a:r>
+              <a:rPr lang="de-DE" dirty="0" smtClean="0"/>
+              <a:t>Implementierungslogik – anderes Wort finden</a:t>
+            </a:r>
+            <a:endParaRPr lang="de-DE" dirty="0"/>
+          </a:p>
+        </p:txBody>
+      </p:sp>
+      <p:sp>
+        <p:nvSpPr>
+          <p:cNvPr id="7" name="Gestreifter Pfeil nach rechts 6"/>
+          <p:cNvSpPr/>
+          <p:nvPr/>
+        </p:nvSpPr>
+        <p:spPr>
+          <a:xfrm rot="5400000">
+            <a:off x="1616458" y="3216782"/>
+            <a:ext cx="3282319" cy="2138093"/>
+          </a:xfrm>
+          <a:prstGeom prst="stripedRightArrow">
+            <a:avLst/>
+          </a:prstGeom>
+          <a:solidFill>
+            <a:schemeClr val="bg1"/>
+          </a:solidFill>
+          <a:ln w="19050">
+            <a:solidFill>
+              <a:srgbClr val="FF0000"/>
+            </a:solidFill>
+          </a:ln>
+        </p:spPr>
+        <p:style>
+          <a:lnRef idx="2">
+            <a:schemeClr val="accent1">
+              <a:shade val="50000"/>
+            </a:schemeClr>
+          </a:lnRef>
+          <a:fillRef idx="1">
+            <a:schemeClr val="accent1"/>
+          </a:fillRef>
+          <a:effectRef idx="0">
+            <a:schemeClr val="accent1"/>
+          </a:effectRef>
+          <a:fontRef idx="minor">
+            <a:schemeClr val="lt1"/>
+          </a:fontRef>
+        </p:style>
+        <p:txBody>
+          <a:bodyPr rtlCol="0" anchor="ctr"/>
+          <a:lstStyle/>
+          <a:p>
+            <a:pPr algn="ctr"/>
+            <a:endParaRPr lang="de-DE"/>
+          </a:p>
+        </p:txBody>
+      </p:sp>
+      <p:sp>
+        <p:nvSpPr>
+          <p:cNvPr id="8" name="Rechteck 7"/>
+          <p:cNvSpPr/>
+          <p:nvPr/>
+        </p:nvSpPr>
+        <p:spPr>
+          <a:xfrm>
+            <a:off x="2856084" y="3098948"/>
+            <a:ext cx="311084" cy="245097"/>
+          </a:xfrm>
+          <a:prstGeom prst="rect">
+            <a:avLst/>
+          </a:prstGeom>
+          <a:solidFill>
+            <a:schemeClr val="bg1"/>
+          </a:solidFill>
+        </p:spPr>
+        <p:style>
+          <a:lnRef idx="2">
+            <a:schemeClr val="dk1">
+              <a:shade val="50000"/>
+            </a:schemeClr>
+          </a:lnRef>
+          <a:fillRef idx="1">
+            <a:schemeClr val="dk1"/>
+          </a:fillRef>
+          <a:effectRef idx="0">
+            <a:schemeClr val="dk1"/>
+          </a:effectRef>
+          <a:fontRef idx="minor">
+            <a:schemeClr val="lt1"/>
+          </a:fontRef>
+        </p:style>
+        <p:txBody>
+          <a:bodyPr rtlCol="0" anchor="ctr"/>
+          <a:lstStyle/>
+          <a:p>
+            <a:pPr algn="ctr"/>
+            <a:endParaRPr lang="de-DE"/>
+          </a:p>
+        </p:txBody>
+      </p:sp>
+      <p:sp>
+        <p:nvSpPr>
+          <p:cNvPr id="9" name="Rechteck 8"/>
+          <p:cNvSpPr/>
+          <p:nvPr/>
+        </p:nvSpPr>
+        <p:spPr>
+          <a:xfrm>
+            <a:off x="2856084" y="3553227"/>
+            <a:ext cx="311084" cy="245097"/>
+          </a:xfrm>
+          <a:prstGeom prst="rect">
+            <a:avLst/>
+          </a:prstGeom>
+          <a:solidFill>
+            <a:schemeClr val="bg1"/>
+          </a:solidFill>
+        </p:spPr>
+        <p:style>
+          <a:lnRef idx="2">
+            <a:schemeClr val="dk1">
+              <a:shade val="50000"/>
+            </a:schemeClr>
+          </a:lnRef>
+          <a:fillRef idx="1">
+            <a:schemeClr val="dk1"/>
+          </a:fillRef>
+          <a:effectRef idx="0">
+            <a:schemeClr val="dk1"/>
+          </a:effectRef>
+          <a:fontRef idx="minor">
+            <a:schemeClr val="lt1"/>
+          </a:fontRef>
+        </p:style>
+        <p:txBody>
+          <a:bodyPr rtlCol="0" anchor="ctr"/>
+          <a:lstStyle/>
+          <a:p>
+            <a:pPr algn="ctr"/>
+            <a:endParaRPr lang="de-DE"/>
+          </a:p>
+        </p:txBody>
+      </p:sp>
+      <p:sp>
+        <p:nvSpPr>
+          <p:cNvPr id="10" name="Rechteck 9"/>
+          <p:cNvSpPr/>
+          <p:nvPr/>
+        </p:nvSpPr>
+        <p:spPr>
+          <a:xfrm>
+            <a:off x="2856084" y="4040731"/>
+            <a:ext cx="311084" cy="245097"/>
+          </a:xfrm>
+          <a:prstGeom prst="rect">
+            <a:avLst/>
+          </a:prstGeom>
+          <a:solidFill>
+            <a:schemeClr val="bg1"/>
+          </a:solidFill>
+        </p:spPr>
+        <p:style>
+          <a:lnRef idx="2">
+            <a:schemeClr val="dk1">
+              <a:shade val="50000"/>
+            </a:schemeClr>
+          </a:lnRef>
+          <a:fillRef idx="1">
+            <a:schemeClr val="dk1"/>
+          </a:fillRef>
+          <a:effectRef idx="0">
+            <a:schemeClr val="dk1"/>
+          </a:effectRef>
+          <a:fontRef idx="minor">
+            <a:schemeClr val="lt1"/>
+          </a:fontRef>
+        </p:style>
+        <p:txBody>
+          <a:bodyPr rtlCol="0" anchor="ctr"/>
+          <a:lstStyle/>
+          <a:p>
+            <a:pPr algn="ctr"/>
+            <a:endParaRPr lang="de-DE"/>
+          </a:p>
+        </p:txBody>
+      </p:sp>
+      <p:sp>
+        <p:nvSpPr>
+          <p:cNvPr id="11" name="Rechteck 10"/>
+          <p:cNvSpPr/>
+          <p:nvPr/>
+        </p:nvSpPr>
+        <p:spPr>
+          <a:xfrm>
+            <a:off x="2856084" y="4496355"/>
+            <a:ext cx="311084" cy="245097"/>
+          </a:xfrm>
+          <a:prstGeom prst="rect">
+            <a:avLst/>
+          </a:prstGeom>
+          <a:solidFill>
+            <a:schemeClr val="bg1"/>
+          </a:solidFill>
+        </p:spPr>
+        <p:style>
+          <a:lnRef idx="2">
+            <a:schemeClr val="dk1">
+              <a:shade val="50000"/>
+            </a:schemeClr>
+          </a:lnRef>
+          <a:fillRef idx="1">
+            <a:schemeClr val="dk1"/>
+          </a:fillRef>
+          <a:effectRef idx="0">
+            <a:schemeClr val="dk1"/>
+          </a:effectRef>
+          <a:fontRef idx="minor">
+            <a:schemeClr val="lt1"/>
+          </a:fontRef>
+        </p:style>
+        <p:txBody>
+          <a:bodyPr rtlCol="0" anchor="ctr"/>
+          <a:lstStyle/>
+          <a:p>
+            <a:pPr algn="ctr"/>
+            <a:endParaRPr lang="de-DE"/>
+          </a:p>
+        </p:txBody>
+      </p:sp>
+      <p:sp>
+        <p:nvSpPr>
+          <p:cNvPr id="13" name="Multiplizieren 12"/>
+          <p:cNvSpPr/>
+          <p:nvPr/>
+        </p:nvSpPr>
+        <p:spPr>
+          <a:xfrm>
+            <a:off x="2872580" y="3055630"/>
+            <a:ext cx="278091" cy="331731"/>
+          </a:xfrm>
+          <a:prstGeom prst="mathMultiply">
+            <a:avLst/>
+          </a:prstGeom>
+          <a:solidFill>
+            <a:srgbClr val="FF0000"/>
+          </a:solidFill>
+          <a:ln>
+            <a:solidFill>
+              <a:srgbClr val="FF0000"/>
+            </a:solidFill>
+          </a:ln>
+        </p:spPr>
+        <p:style>
+          <a:lnRef idx="2">
+            <a:schemeClr val="accent1">
+              <a:shade val="50000"/>
+            </a:schemeClr>
+          </a:lnRef>
+          <a:fillRef idx="1">
+            <a:schemeClr val="accent1"/>
+          </a:fillRef>
+          <a:effectRef idx="0">
+            <a:schemeClr val="accent1"/>
+          </a:effectRef>
+          <a:fontRef idx="minor">
+            <a:schemeClr val="lt1"/>
+          </a:fontRef>
+        </p:style>
+        <p:txBody>
+          <a:bodyPr rtlCol="0" anchor="ctr"/>
+          <a:lstStyle/>
+          <a:p>
+            <a:pPr algn="ctr"/>
+            <a:endParaRPr lang="de-DE"/>
+          </a:p>
+        </p:txBody>
+      </p:sp>
+      <p:sp>
+        <p:nvSpPr>
+          <p:cNvPr id="14" name="Multiplizieren 13"/>
+          <p:cNvSpPr/>
+          <p:nvPr/>
+        </p:nvSpPr>
+        <p:spPr>
+          <a:xfrm>
+            <a:off x="2874936" y="3509909"/>
+            <a:ext cx="278091" cy="331731"/>
+          </a:xfrm>
+          <a:prstGeom prst="mathMultiply">
+            <a:avLst/>
+          </a:prstGeom>
+          <a:solidFill>
+            <a:srgbClr val="FF0000"/>
+          </a:solidFill>
+          <a:ln>
+            <a:solidFill>
+              <a:srgbClr val="FF0000"/>
+            </a:solidFill>
+          </a:ln>
+        </p:spPr>
+        <p:style>
+          <a:lnRef idx="2">
+            <a:schemeClr val="accent1">
+              <a:shade val="50000"/>
+            </a:schemeClr>
+          </a:lnRef>
+          <a:fillRef idx="1">
+            <a:schemeClr val="accent1"/>
+          </a:fillRef>
+          <a:effectRef idx="0">
+            <a:schemeClr val="accent1"/>
+          </a:effectRef>
+          <a:fontRef idx="minor">
+            <a:schemeClr val="lt1"/>
+          </a:fontRef>
+        </p:style>
+        <p:txBody>
+          <a:bodyPr rtlCol="0" anchor="ctr"/>
+          <a:lstStyle/>
+          <a:p>
+            <a:pPr algn="ctr"/>
+            <a:endParaRPr lang="de-DE"/>
+          </a:p>
+        </p:txBody>
+      </p:sp>
+      <p:sp>
+        <p:nvSpPr>
+          <p:cNvPr id="15" name="Multiplizieren 14"/>
+          <p:cNvSpPr/>
+          <p:nvPr/>
+        </p:nvSpPr>
+        <p:spPr>
+          <a:xfrm>
+            <a:off x="2889077" y="4453037"/>
+            <a:ext cx="278091" cy="331731"/>
+          </a:xfrm>
+          <a:prstGeom prst="mathMultiply">
+            <a:avLst/>
+          </a:prstGeom>
+          <a:solidFill>
+            <a:srgbClr val="FF0000"/>
+          </a:solidFill>
+          <a:ln>
+            <a:solidFill>
+              <a:srgbClr val="FF0000"/>
+            </a:solidFill>
+          </a:ln>
+        </p:spPr>
+        <p:style>
+          <a:lnRef idx="2">
+            <a:schemeClr val="accent1">
+              <a:shade val="50000"/>
+            </a:schemeClr>
+          </a:lnRef>
+          <a:fillRef idx="1">
+            <a:schemeClr val="accent1"/>
+          </a:fillRef>
+          <a:effectRef idx="0">
+            <a:schemeClr val="accent1"/>
+          </a:effectRef>
+          <a:fontRef idx="minor">
+            <a:schemeClr val="lt1"/>
+          </a:fontRef>
+        </p:style>
+        <p:txBody>
+          <a:bodyPr rtlCol="0" anchor="ctr"/>
+          <a:lstStyle/>
+          <a:p>
+            <a:pPr algn="ctr"/>
+            <a:endParaRPr lang="de-DE"/>
+          </a:p>
+        </p:txBody>
+      </p:sp>
+      <p:sp>
+        <p:nvSpPr>
+          <p:cNvPr id="16" name="Multiplizieren 15"/>
+          <p:cNvSpPr/>
+          <p:nvPr/>
+        </p:nvSpPr>
+        <p:spPr>
+          <a:xfrm>
+            <a:off x="2872580" y="4008851"/>
+            <a:ext cx="278091" cy="331731"/>
+          </a:xfrm>
+          <a:prstGeom prst="mathMultiply">
+            <a:avLst/>
+          </a:prstGeom>
+          <a:solidFill>
+            <a:srgbClr val="FF0000"/>
+          </a:solidFill>
+          <a:ln>
+            <a:solidFill>
+              <a:srgbClr val="FF0000"/>
+            </a:solidFill>
+          </a:ln>
+        </p:spPr>
+        <p:style>
+          <a:lnRef idx="2">
+            <a:schemeClr val="accent1">
+              <a:shade val="50000"/>
+            </a:schemeClr>
+          </a:lnRef>
+          <a:fillRef idx="1">
+            <a:schemeClr val="accent1"/>
+          </a:fillRef>
+          <a:effectRef idx="0">
+            <a:schemeClr val="accent1"/>
+          </a:effectRef>
+          <a:fontRef idx="minor">
+            <a:schemeClr val="lt1"/>
+          </a:fontRef>
+        </p:style>
+        <p:txBody>
+          <a:bodyPr rtlCol="0" anchor="ctr"/>
+          <a:lstStyle/>
+          <a:p>
+            <a:pPr algn="ctr"/>
+            <a:endParaRPr lang="de-DE"/>
+          </a:p>
+        </p:txBody>
+      </p:sp>
+      <p:cxnSp>
+        <p:nvCxnSpPr>
+          <p:cNvPr id="18" name="Gerader Verbinder 17"/>
+          <p:cNvCxnSpPr/>
+          <p:nvPr/>
+        </p:nvCxnSpPr>
+        <p:spPr>
+          <a:xfrm>
+            <a:off x="3412265" y="3221494"/>
+            <a:ext cx="254523" cy="0"/>
+          </a:xfrm>
+          <a:prstGeom prst="line">
+            <a:avLst/>
+          </a:prstGeom>
+        </p:spPr>
+        <p:style>
+          <a:lnRef idx="1">
+            <a:schemeClr val="dk1"/>
+          </a:lnRef>
+          <a:fillRef idx="0">
+            <a:schemeClr val="dk1"/>
+          </a:fillRef>
+          <a:effectRef idx="0">
+            <a:schemeClr val="dk1"/>
+          </a:effectRef>
+          <a:fontRef idx="minor">
+            <a:schemeClr val="tx1"/>
+          </a:fontRef>
+        </p:style>
+      </p:cxnSp>
+      <p:cxnSp>
+        <p:nvCxnSpPr>
+          <p:cNvPr id="21" name="Gerader Verbinder 20"/>
+          <p:cNvCxnSpPr/>
+          <p:nvPr/>
+        </p:nvCxnSpPr>
+        <p:spPr>
+          <a:xfrm>
+            <a:off x="3412265" y="3317333"/>
+            <a:ext cx="254523" cy="0"/>
+          </a:xfrm>
+          <a:prstGeom prst="line">
+            <a:avLst/>
+          </a:prstGeom>
+        </p:spPr>
+        <p:style>
+          <a:lnRef idx="1">
+            <a:schemeClr val="dk1"/>
+          </a:lnRef>
+          <a:fillRef idx="0">
+            <a:schemeClr val="dk1"/>
+          </a:fillRef>
+          <a:effectRef idx="0">
+            <a:schemeClr val="dk1"/>
+          </a:effectRef>
+          <a:fontRef idx="minor">
+            <a:schemeClr val="tx1"/>
+          </a:fontRef>
+        </p:style>
+      </p:cxnSp>
+      <p:cxnSp>
+        <p:nvCxnSpPr>
+          <p:cNvPr id="22" name="Gerader Verbinder 21"/>
+          <p:cNvCxnSpPr/>
+          <p:nvPr/>
+        </p:nvCxnSpPr>
+        <p:spPr>
+          <a:xfrm>
+            <a:off x="3412265" y="3553227"/>
+            <a:ext cx="254523" cy="0"/>
+          </a:xfrm>
+          <a:prstGeom prst="line">
+            <a:avLst/>
+          </a:prstGeom>
+        </p:spPr>
+        <p:style>
+          <a:lnRef idx="1">
+            <a:schemeClr val="dk1"/>
+          </a:lnRef>
+          <a:fillRef idx="0">
+            <a:schemeClr val="dk1"/>
+          </a:fillRef>
+          <a:effectRef idx="0">
+            <a:schemeClr val="dk1"/>
+          </a:effectRef>
+          <a:fontRef idx="minor">
+            <a:schemeClr val="tx1"/>
+          </a:fontRef>
+        </p:style>
+      </p:cxnSp>
+      <p:cxnSp>
+        <p:nvCxnSpPr>
+          <p:cNvPr id="23" name="Gerader Verbinder 22"/>
+          <p:cNvCxnSpPr/>
+          <p:nvPr/>
+        </p:nvCxnSpPr>
+        <p:spPr>
+          <a:xfrm>
+            <a:off x="3412264" y="3675774"/>
+            <a:ext cx="254523" cy="0"/>
+          </a:xfrm>
+          <a:prstGeom prst="line">
+            <a:avLst/>
+          </a:prstGeom>
+        </p:spPr>
+        <p:style>
+          <a:lnRef idx="1">
+            <a:schemeClr val="dk1"/>
+          </a:lnRef>
+          <a:fillRef idx="0">
+            <a:schemeClr val="dk1"/>
+          </a:fillRef>
+          <a:effectRef idx="0">
+            <a:schemeClr val="dk1"/>
+          </a:effectRef>
+          <a:fontRef idx="minor">
+            <a:schemeClr val="tx1"/>
+          </a:fontRef>
+        </p:style>
+      </p:cxnSp>
+      <p:cxnSp>
+        <p:nvCxnSpPr>
+          <p:cNvPr id="24" name="Gerader Verbinder 23"/>
+          <p:cNvCxnSpPr/>
+          <p:nvPr/>
+        </p:nvCxnSpPr>
+        <p:spPr>
+          <a:xfrm>
+            <a:off x="3412264" y="3798324"/>
+            <a:ext cx="254523" cy="0"/>
+          </a:xfrm>
+          <a:prstGeom prst="line">
+            <a:avLst/>
+          </a:prstGeom>
+        </p:spPr>
+        <p:style>
+          <a:lnRef idx="1">
+            <a:schemeClr val="dk1"/>
+          </a:lnRef>
+          <a:fillRef idx="0">
+            <a:schemeClr val="dk1"/>
+          </a:fillRef>
+          <a:effectRef idx="0">
+            <a:schemeClr val="dk1"/>
+          </a:effectRef>
+          <a:fontRef idx="minor">
+            <a:schemeClr val="tx1"/>
+          </a:fontRef>
+        </p:style>
+      </p:cxnSp>
+      <p:cxnSp>
+        <p:nvCxnSpPr>
+          <p:cNvPr id="26" name="Gerader Verbinder 25"/>
+          <p:cNvCxnSpPr/>
+          <p:nvPr/>
+        </p:nvCxnSpPr>
+        <p:spPr>
+          <a:xfrm>
+            <a:off x="3412263" y="4592190"/>
+            <a:ext cx="254523" cy="0"/>
+          </a:xfrm>
+          <a:prstGeom prst="line">
+            <a:avLst/>
+          </a:prstGeom>
+        </p:spPr>
+        <p:style>
+          <a:lnRef idx="1">
+            <a:schemeClr val="dk1"/>
+          </a:lnRef>
+          <a:fillRef idx="0">
+            <a:schemeClr val="dk1"/>
+          </a:fillRef>
+          <a:effectRef idx="0">
+            <a:schemeClr val="dk1"/>
+          </a:effectRef>
+          <a:fontRef idx="minor">
+            <a:schemeClr val="tx1"/>
+          </a:fontRef>
+        </p:style>
+      </p:cxnSp>
+      <p:cxnSp>
+        <p:nvCxnSpPr>
+          <p:cNvPr id="27" name="Gerader Verbinder 26"/>
+          <p:cNvCxnSpPr/>
+          <p:nvPr/>
+        </p:nvCxnSpPr>
+        <p:spPr>
+          <a:xfrm>
+            <a:off x="3412262" y="4496355"/>
+            <a:ext cx="254523" cy="0"/>
+          </a:xfrm>
+          <a:prstGeom prst="line">
+            <a:avLst/>
+          </a:prstGeom>
+        </p:spPr>
+        <p:style>
+          <a:lnRef idx="1">
+            <a:schemeClr val="dk1"/>
+          </a:lnRef>
+          <a:fillRef idx="0">
+            <a:schemeClr val="dk1"/>
+          </a:fillRef>
+          <a:effectRef idx="0">
+            <a:schemeClr val="dk1"/>
+          </a:effectRef>
+          <a:fontRef idx="minor">
+            <a:schemeClr val="tx1"/>
+          </a:fontRef>
+        </p:style>
+      </p:cxnSp>
+      <p:pic>
+        <p:nvPicPr>
+          <p:cNvPr id="2050" name="Picture 2" descr="https://upload.wikimedia.org/wikipedia/commons/thumb/9/92/The_death.png/113px-The_death.png"/>
+          <p:cNvPicPr>
+            <a:picLocks noChangeAspect="1" noChangeArrowheads="1"/>
+          </p:cNvPicPr>
+          <p:nvPr/>
+        </p:nvPicPr>
+        <p:blipFill>
+          <a:blip r:embed="rId2">
+            <a:extLst>
+              <a:ext uri="{28A0092B-C50C-407E-A947-70E740481C1C}">
+                <a14:useLocalDpi xmlns:a14="http://schemas.microsoft.com/office/drawing/2010/main" val="0"/>
+              </a:ext>
+            </a:extLst>
+          </a:blip>
+          <a:srcRect/>
+          <a:stretch>
+            <a:fillRect/>
+          </a:stretch>
+        </p:blipFill>
+        <p:spPr bwMode="auto">
+          <a:xfrm>
+            <a:off x="8257877" y="5095942"/>
+            <a:ext cx="501861" cy="532950"/>
+          </a:xfrm>
+          <a:prstGeom prst="rect">
+            <a:avLst/>
+          </a:prstGeom>
+          <a:noFill/>
+          <a:extLst>
+            <a:ext uri="{909E8E84-426E-40DD-AFC4-6F175D3DCCD1}">
+              <a14:hiddenFill xmlns:a14="http://schemas.microsoft.com/office/drawing/2010/main">
+                <a:solidFill>
+                  <a:srgbClr val="FFFFFF"/>
+                </a:solidFill>
+              </a14:hiddenFill>
+            </a:ext>
+          </a:extLst>
+        </p:spPr>
+      </p:pic>
+      <p:pic>
+        <p:nvPicPr>
+          <p:cNvPr id="28" name="Grafik 27"/>
+          <p:cNvPicPr>
+            <a:picLocks noChangeAspect="1"/>
+          </p:cNvPicPr>
+          <p:nvPr/>
+        </p:nvPicPr>
+        <p:blipFill>
+          <a:blip r:embed="rId3" cstate="print">
+            <a:extLst>
+              <a:ext uri="{28A0092B-C50C-407E-A947-70E740481C1C}">
+                <a14:useLocalDpi xmlns:a14="http://schemas.microsoft.com/office/drawing/2010/main" val="0"/>
+              </a:ext>
+            </a:extLst>
+          </a:blip>
+          <a:stretch>
+            <a:fillRect/>
+          </a:stretch>
+        </p:blipFill>
+        <p:spPr>
+          <a:xfrm>
+            <a:off x="3150670" y="5258942"/>
+            <a:ext cx="186275" cy="274156"/>
+          </a:xfrm>
+          <a:prstGeom prst="rect">
+            <a:avLst/>
+          </a:prstGeom>
+        </p:spPr>
+      </p:pic>
+      <p:sp>
+        <p:nvSpPr>
+          <p:cNvPr id="30" name="Nach oben gekrümmter Pfeil 29"/>
+          <p:cNvSpPr/>
+          <p:nvPr/>
+        </p:nvSpPr>
+        <p:spPr>
+          <a:xfrm rot="5400000">
+            <a:off x="2681352" y="5066271"/>
+            <a:ext cx="455013" cy="332990"/>
+          </a:xfrm>
+          <a:prstGeom prst="curvedUpArrow">
+            <a:avLst/>
+          </a:prstGeom>
+          <a:solidFill>
+            <a:srgbClr val="FF0000"/>
+          </a:solidFill>
+          <a:ln>
+            <a:solidFill>
+              <a:srgbClr val="FF0000"/>
+            </a:solidFill>
+          </a:ln>
+        </p:spPr>
+        <p:style>
+          <a:lnRef idx="2">
+            <a:schemeClr val="accent1">
+              <a:shade val="50000"/>
+            </a:schemeClr>
+          </a:lnRef>
+          <a:fillRef idx="1">
+            <a:schemeClr val="accent1"/>
+          </a:fillRef>
+          <a:effectRef idx="0">
+            <a:schemeClr val="accent1"/>
+          </a:effectRef>
+          <a:fontRef idx="minor">
+            <a:schemeClr val="lt1"/>
+          </a:fontRef>
+        </p:style>
+        <p:txBody>
+          <a:bodyPr rtlCol="0" anchor="ctr"/>
+          <a:lstStyle/>
+          <a:p>
+            <a:pPr algn="ctr"/>
+            <a:endParaRPr lang="de-DE">
+              <a:solidFill>
+                <a:schemeClr val="tx1"/>
+              </a:solidFill>
+            </a:endParaRPr>
+          </a:p>
+        </p:txBody>
+      </p:sp>
+      <p:sp>
+        <p:nvSpPr>
+          <p:cNvPr id="31" name="Textfeld 30"/>
+          <p:cNvSpPr txBox="1"/>
+          <p:nvPr/>
+        </p:nvSpPr>
+        <p:spPr>
+          <a:xfrm>
+            <a:off x="-9100" y="3558682"/>
+            <a:ext cx="1456232" cy="369332"/>
+          </a:xfrm>
+          <a:prstGeom prst="rect">
+            <a:avLst/>
+          </a:prstGeom>
+          <a:noFill/>
+        </p:spPr>
+        <p:txBody>
+          <a:bodyPr wrap="none" rtlCol="0">
+            <a:spAutoFit/>
+          </a:bodyPr>
+          <a:lstStyle/>
+          <a:p>
+            <a:r>
+              <a:rPr lang="de-DE" dirty="0" smtClean="0"/>
+              <a:t>Server startet</a:t>
+            </a:r>
+          </a:p>
+        </p:txBody>
+      </p:sp>
+      <p:sp>
+        <p:nvSpPr>
+          <p:cNvPr id="2048" name="Pfeil nach rechts 2047"/>
+          <p:cNvSpPr/>
+          <p:nvPr/>
+        </p:nvSpPr>
+        <p:spPr>
+          <a:xfrm>
+            <a:off x="4791162" y="3952743"/>
+            <a:ext cx="488258" cy="314381"/>
+          </a:xfrm>
+          <a:prstGeom prst="rightArrow">
+            <a:avLst/>
+          </a:prstGeom>
+        </p:spPr>
+        <p:style>
+          <a:lnRef idx="2">
+            <a:schemeClr val="dk1">
+              <a:shade val="50000"/>
+            </a:schemeClr>
+          </a:lnRef>
+          <a:fillRef idx="1">
+            <a:schemeClr val="dk1"/>
+          </a:fillRef>
+          <a:effectRef idx="0">
+            <a:schemeClr val="dk1"/>
+          </a:effectRef>
+          <a:fontRef idx="minor">
+            <a:schemeClr val="lt1"/>
+          </a:fontRef>
+        </p:style>
+        <p:txBody>
+          <a:bodyPr rtlCol="0" anchor="ctr"/>
+          <a:lstStyle/>
+          <a:p>
+            <a:pPr algn="ctr"/>
+            <a:endParaRPr lang="de-DE"/>
+          </a:p>
+        </p:txBody>
+      </p:sp>
+      <p:cxnSp>
+        <p:nvCxnSpPr>
+          <p:cNvPr id="37" name="Gerader Verbinder 36"/>
+          <p:cNvCxnSpPr/>
+          <p:nvPr/>
+        </p:nvCxnSpPr>
+        <p:spPr>
+          <a:xfrm>
+            <a:off x="3412262" y="4175615"/>
+            <a:ext cx="254523" cy="0"/>
+          </a:xfrm>
+          <a:prstGeom prst="line">
+            <a:avLst/>
+          </a:prstGeom>
+        </p:spPr>
+        <p:style>
+          <a:lnRef idx="1">
+            <a:schemeClr val="dk1"/>
+          </a:lnRef>
+          <a:fillRef idx="0">
+            <a:schemeClr val="dk1"/>
+          </a:fillRef>
+          <a:effectRef idx="0">
+            <a:schemeClr val="dk1"/>
+          </a:effectRef>
+          <a:fontRef idx="minor">
+            <a:schemeClr val="tx1"/>
+          </a:fontRef>
+        </p:style>
+      </p:cxnSp>
+      <p:sp>
+        <p:nvSpPr>
+          <p:cNvPr id="38" name="Nach oben gekrümmter Pfeil 37"/>
+          <p:cNvSpPr/>
+          <p:nvPr/>
+        </p:nvSpPr>
+        <p:spPr>
+          <a:xfrm rot="16200000">
+            <a:off x="3351251" y="5055140"/>
+            <a:ext cx="455013" cy="332990"/>
+          </a:xfrm>
+          <a:prstGeom prst="curvedUpArrow">
+            <a:avLst/>
+          </a:prstGeom>
+          <a:solidFill>
+            <a:srgbClr val="FF0000"/>
+          </a:solidFill>
+          <a:ln>
+            <a:solidFill>
+              <a:srgbClr val="FF0000"/>
+            </a:solidFill>
+          </a:ln>
+        </p:spPr>
+        <p:style>
+          <a:lnRef idx="2">
+            <a:schemeClr val="accent1">
+              <a:shade val="50000"/>
+            </a:schemeClr>
+          </a:lnRef>
+          <a:fillRef idx="1">
+            <a:schemeClr val="accent1"/>
+          </a:fillRef>
+          <a:effectRef idx="0">
+            <a:schemeClr val="accent1"/>
+          </a:effectRef>
+          <a:fontRef idx="minor">
+            <a:schemeClr val="lt1"/>
+          </a:fontRef>
+        </p:style>
+        <p:txBody>
+          <a:bodyPr rtlCol="0" anchor="ctr"/>
+          <a:lstStyle/>
+          <a:p>
+            <a:pPr algn="ctr"/>
+            <a:endParaRPr lang="de-DE">
+              <a:solidFill>
+                <a:schemeClr val="tx1"/>
+              </a:solidFill>
+            </a:endParaRPr>
+          </a:p>
+        </p:txBody>
+      </p:sp>
+      <p:pic>
+        <p:nvPicPr>
+          <p:cNvPr id="2061" name="Grafik 2060"/>
+          <p:cNvPicPr>
+            <a:picLocks noChangeAspect="1"/>
+          </p:cNvPicPr>
+          <p:nvPr/>
+        </p:nvPicPr>
+        <p:blipFill>
+          <a:blip r:embed="rId4" cstate="print">
+            <a:extLst>
+              <a:ext uri="{28A0092B-C50C-407E-A947-70E740481C1C}">
+                <a14:useLocalDpi xmlns:a14="http://schemas.microsoft.com/office/drawing/2010/main" val="0"/>
+              </a:ext>
+            </a:extLst>
+          </a:blip>
+          <a:stretch>
+            <a:fillRect/>
+          </a:stretch>
+        </p:blipFill>
+        <p:spPr>
+          <a:xfrm>
+            <a:off x="5738094" y="2644669"/>
+            <a:ext cx="1022195" cy="1538971"/>
+          </a:xfrm>
+          <a:prstGeom prst="rect">
+            <a:avLst/>
+          </a:prstGeom>
+        </p:spPr>
+      </p:pic>
+      <p:pic>
+        <p:nvPicPr>
+          <p:cNvPr id="89" name="Picture 2" descr="https://image.freepik.com/free-icon/envelope-rectangular-outline-variant_318-46239.jpg"/>
+          <p:cNvPicPr>
+            <a:picLocks noChangeAspect="1" noChangeArrowheads="1"/>
+          </p:cNvPicPr>
+          <p:nvPr/>
+        </p:nvPicPr>
+        <p:blipFill>
+          <a:blip r:embed="rId5" cstate="print">
+            <a:extLst>
+              <a:ext uri="{28A0092B-C50C-407E-A947-70E740481C1C}">
+                <a14:useLocalDpi xmlns:a14="http://schemas.microsoft.com/office/drawing/2010/main" val="0"/>
+              </a:ext>
+            </a:extLst>
+          </a:blip>
+          <a:srcRect/>
+          <a:stretch>
+            <a:fillRect/>
+          </a:stretch>
+        </p:blipFill>
+        <p:spPr bwMode="auto">
+          <a:xfrm>
+            <a:off x="7555177" y="3387361"/>
+            <a:ext cx="375444" cy="375444"/>
+          </a:xfrm>
+          <a:prstGeom prst="rect">
+            <a:avLst/>
+          </a:prstGeom>
+          <a:noFill/>
+          <a:extLst>
+            <a:ext uri="{909E8E84-426E-40DD-AFC4-6F175D3DCCD1}">
+              <a14:hiddenFill xmlns:a14="http://schemas.microsoft.com/office/drawing/2010/main">
+                <a:solidFill>
+                  <a:srgbClr val="FFFFFF"/>
+                </a:solidFill>
+              </a14:hiddenFill>
+            </a:ext>
+          </a:extLst>
+        </p:spPr>
+      </p:pic>
+      <p:pic>
+        <p:nvPicPr>
+          <p:cNvPr id="90" name="Picture 2" descr="https://image.freepik.com/free-icon/envelope-rectangular-outline-variant_318-46239.jpg"/>
+          <p:cNvPicPr>
+            <a:picLocks noChangeAspect="1" noChangeArrowheads="1"/>
+          </p:cNvPicPr>
+          <p:nvPr/>
+        </p:nvPicPr>
+        <p:blipFill>
+          <a:blip r:embed="rId5" cstate="print">
+            <a:extLst>
+              <a:ext uri="{28A0092B-C50C-407E-A947-70E740481C1C}">
+                <a14:useLocalDpi xmlns:a14="http://schemas.microsoft.com/office/drawing/2010/main" val="0"/>
+              </a:ext>
+            </a:extLst>
+          </a:blip>
+          <a:srcRect/>
+          <a:stretch>
+            <a:fillRect/>
+          </a:stretch>
+        </p:blipFill>
+        <p:spPr bwMode="auto">
+          <a:xfrm>
+            <a:off x="7555177" y="3777840"/>
+            <a:ext cx="375444" cy="375444"/>
+          </a:xfrm>
+          <a:prstGeom prst="rect">
+            <a:avLst/>
+          </a:prstGeom>
+          <a:noFill/>
+          <a:extLst>
+            <a:ext uri="{909E8E84-426E-40DD-AFC4-6F175D3DCCD1}">
+              <a14:hiddenFill xmlns:a14="http://schemas.microsoft.com/office/drawing/2010/main">
+                <a:solidFill>
+                  <a:srgbClr val="FFFFFF"/>
+                </a:solidFill>
+              </a14:hiddenFill>
+            </a:ext>
+          </a:extLst>
+        </p:spPr>
+      </p:pic>
+      <p:sp>
+        <p:nvSpPr>
+          <p:cNvPr id="91" name="Line 43"/>
+          <p:cNvSpPr>
+            <a:spLocks noChangeShapeType="1"/>
+          </p:cNvSpPr>
+          <p:nvPr/>
+        </p:nvSpPr>
+        <p:spPr bwMode="auto">
+          <a:xfrm>
+            <a:off x="7468890" y="3780016"/>
+            <a:ext cx="181930" cy="0"/>
+          </a:xfrm>
+          <a:prstGeom prst="line">
+            <a:avLst/>
+          </a:prstGeom>
+          <a:noFill/>
+          <a:ln w="28575">
+            <a:solidFill>
+              <a:schemeClr val="tx1"/>
+            </a:solidFill>
+            <a:round/>
+            <a:headEnd/>
+            <a:tailEnd type="triangle" w="med" len="med"/>
+          </a:ln>
+          <a:extLst>
+            <a:ext uri="{909E8E84-426E-40DD-AFC4-6F175D3DCCD1}">
+              <a14:hiddenFill xmlns:a14="http://schemas.microsoft.com/office/drawing/2010/main">
+                <a:noFill/>
+              </a14:hiddenFill>
+            </a:ext>
+          </a:extLst>
+        </p:spPr>
+        <p:txBody>
+          <a:bodyPr lIns="82124" tIns="41061" rIns="82124" bIns="41061"/>
+          <a:lstStyle/>
+          <a:p>
+            <a:endParaRPr lang="de-DE"/>
+          </a:p>
+        </p:txBody>
+      </p:sp>
+      <p:sp>
+        <p:nvSpPr>
+          <p:cNvPr id="92" name="Line 43"/>
+          <p:cNvSpPr>
+            <a:spLocks noChangeShapeType="1"/>
+          </p:cNvSpPr>
+          <p:nvPr/>
+        </p:nvSpPr>
+        <p:spPr bwMode="auto">
+          <a:xfrm flipH="1">
+            <a:off x="7459533" y="3387361"/>
+            <a:ext cx="191287" cy="0"/>
+          </a:xfrm>
+          <a:prstGeom prst="line">
+            <a:avLst/>
+          </a:prstGeom>
+          <a:noFill/>
+          <a:ln w="28575">
+            <a:solidFill>
+              <a:schemeClr val="tx1"/>
+            </a:solidFill>
+            <a:round/>
+            <a:headEnd/>
+            <a:tailEnd type="triangle" w="med" len="med"/>
+          </a:ln>
+          <a:extLst>
+            <a:ext uri="{909E8E84-426E-40DD-AFC4-6F175D3DCCD1}">
+              <a14:hiddenFill xmlns:a14="http://schemas.microsoft.com/office/drawing/2010/main">
+                <a:noFill/>
+              </a14:hiddenFill>
+            </a:ext>
+          </a:extLst>
+        </p:spPr>
+        <p:txBody>
+          <a:bodyPr lIns="82124" tIns="41061" rIns="82124" bIns="41061"/>
+          <a:lstStyle/>
+          <a:p>
+            <a:endParaRPr lang="de-DE"/>
+          </a:p>
+        </p:txBody>
+      </p:sp>
+      <p:pic>
+        <p:nvPicPr>
+          <p:cNvPr id="93" name="Grafik 92"/>
+          <p:cNvPicPr>
+            <a:picLocks noChangeAspect="1"/>
+          </p:cNvPicPr>
+          <p:nvPr/>
+        </p:nvPicPr>
+        <p:blipFill>
+          <a:blip r:embed="rId4" cstate="print">
+            <a:extLst>
+              <a:ext uri="{28A0092B-C50C-407E-A947-70E740481C1C}">
+                <a14:useLocalDpi xmlns:a14="http://schemas.microsoft.com/office/drawing/2010/main" val="0"/>
+              </a:ext>
+            </a:extLst>
+          </a:blip>
+          <a:stretch>
+            <a:fillRect/>
+          </a:stretch>
+        </p:blipFill>
+        <p:spPr>
+          <a:xfrm>
+            <a:off x="5738094" y="4426548"/>
+            <a:ext cx="1022195" cy="1538971"/>
+          </a:xfrm>
+          <a:prstGeom prst="rect">
+            <a:avLst/>
+          </a:prstGeom>
+          <a:effectLst/>
+        </p:spPr>
+      </p:pic>
+      <p:pic>
+        <p:nvPicPr>
+          <p:cNvPr id="94" name="Picture 2" descr="https://image.freepik.com/free-icon/envelope-rectangular-outline-variant_318-46239.jpg"/>
+          <p:cNvPicPr>
+            <a:picLocks noChangeAspect="1" noChangeArrowheads="1"/>
+          </p:cNvPicPr>
+          <p:nvPr/>
+        </p:nvPicPr>
+        <p:blipFill>
+          <a:blip r:embed="rId5" cstate="print">
+            <a:extLst>
+              <a:ext uri="{28A0092B-C50C-407E-A947-70E740481C1C}">
+                <a14:useLocalDpi xmlns:a14="http://schemas.microsoft.com/office/drawing/2010/main" val="0"/>
+              </a:ext>
+            </a:extLst>
+          </a:blip>
+          <a:srcRect/>
+          <a:stretch>
+            <a:fillRect/>
+          </a:stretch>
+        </p:blipFill>
+        <p:spPr bwMode="auto">
+          <a:xfrm>
+            <a:off x="6984889" y="5142619"/>
+            <a:ext cx="375444" cy="375444"/>
+          </a:xfrm>
+          <a:prstGeom prst="rect">
+            <a:avLst/>
+          </a:prstGeom>
+          <a:noFill/>
+          <a:effectLst/>
+          <a:extLst>
+            <a:ext uri="{909E8E84-426E-40DD-AFC4-6F175D3DCCD1}">
+              <a14:hiddenFill xmlns:a14="http://schemas.microsoft.com/office/drawing/2010/main">
+                <a:solidFill>
+                  <a:srgbClr val="FFFFFF"/>
+                </a:solidFill>
+              </a14:hiddenFill>
+            </a:ext>
+          </a:extLst>
+        </p:spPr>
+      </p:pic>
+      <p:pic>
+        <p:nvPicPr>
+          <p:cNvPr id="95" name="Picture 2" descr="https://image.freepik.com/free-icon/envelope-rectangular-outline-variant_318-46239.jpg"/>
+          <p:cNvPicPr>
+            <a:picLocks noChangeAspect="1" noChangeArrowheads="1"/>
+          </p:cNvPicPr>
+          <p:nvPr/>
+        </p:nvPicPr>
+        <p:blipFill>
+          <a:blip r:embed="rId5" cstate="print">
+            <a:extLst>
+              <a:ext uri="{28A0092B-C50C-407E-A947-70E740481C1C}">
+                <a14:useLocalDpi xmlns:a14="http://schemas.microsoft.com/office/drawing/2010/main" val="0"/>
+              </a:ext>
+            </a:extLst>
+          </a:blip>
+          <a:srcRect/>
+          <a:stretch>
+            <a:fillRect/>
+          </a:stretch>
+        </p:blipFill>
+        <p:spPr bwMode="auto">
+          <a:xfrm>
+            <a:off x="6984889" y="5533098"/>
+            <a:ext cx="375444" cy="375444"/>
+          </a:xfrm>
+          <a:prstGeom prst="rect">
+            <a:avLst/>
+          </a:prstGeom>
+          <a:noFill/>
+          <a:effectLst/>
+          <a:extLst>
+            <a:ext uri="{909E8E84-426E-40DD-AFC4-6F175D3DCCD1}">
+              <a14:hiddenFill xmlns:a14="http://schemas.microsoft.com/office/drawing/2010/main">
+                <a:solidFill>
+                  <a:srgbClr val="FFFFFF"/>
+                </a:solidFill>
+              </a14:hiddenFill>
+            </a:ext>
+          </a:extLst>
+        </p:spPr>
+      </p:pic>
+      <p:sp>
+        <p:nvSpPr>
+          <p:cNvPr id="96" name="Line 43"/>
+          <p:cNvSpPr>
+            <a:spLocks noChangeShapeType="1"/>
+          </p:cNvSpPr>
+          <p:nvPr/>
+        </p:nvSpPr>
+        <p:spPr bwMode="auto">
+          <a:xfrm>
+            <a:off x="6898602" y="5535274"/>
+            <a:ext cx="181930" cy="0"/>
+          </a:xfrm>
+          <a:prstGeom prst="line">
+            <a:avLst/>
+          </a:prstGeom>
+          <a:noFill/>
+          <a:ln w="28575">
+            <a:solidFill>
+              <a:schemeClr val="tx1"/>
+            </a:solidFill>
+            <a:round/>
+            <a:headEnd/>
+            <a:tailEnd type="triangle" w="med" len="med"/>
+          </a:ln>
+          <a:effectLst/>
+          <a:extLst>
+            <a:ext uri="{909E8E84-426E-40DD-AFC4-6F175D3DCCD1}">
+              <a14:hiddenFill xmlns:a14="http://schemas.microsoft.com/office/drawing/2010/main">
+                <a:noFill/>
+              </a14:hiddenFill>
+            </a:ext>
+          </a:extLst>
+        </p:spPr>
+        <p:txBody>
+          <a:bodyPr lIns="82124" tIns="41061" rIns="82124" bIns="41061"/>
+          <a:lstStyle/>
+          <a:p>
+            <a:endParaRPr lang="de-DE"/>
+          </a:p>
+        </p:txBody>
+      </p:sp>
+      <p:sp>
+        <p:nvSpPr>
+          <p:cNvPr id="97" name="Line 43"/>
+          <p:cNvSpPr>
+            <a:spLocks noChangeShapeType="1"/>
+          </p:cNvSpPr>
+          <p:nvPr/>
+        </p:nvSpPr>
+        <p:spPr bwMode="auto">
+          <a:xfrm flipH="1">
+            <a:off x="6889245" y="5142619"/>
+            <a:ext cx="191287" cy="0"/>
+          </a:xfrm>
+          <a:prstGeom prst="line">
+            <a:avLst/>
+          </a:prstGeom>
+          <a:noFill/>
+          <a:ln w="28575">
+            <a:solidFill>
+              <a:schemeClr val="tx1"/>
+            </a:solidFill>
+            <a:round/>
+            <a:headEnd/>
+            <a:tailEnd type="triangle" w="med" len="med"/>
+          </a:ln>
+          <a:effectLst/>
+          <a:extLst>
+            <a:ext uri="{909E8E84-426E-40DD-AFC4-6F175D3DCCD1}">
+              <a14:hiddenFill xmlns:a14="http://schemas.microsoft.com/office/drawing/2010/main">
+                <a:noFill/>
+              </a14:hiddenFill>
+            </a:ext>
+          </a:extLst>
+        </p:spPr>
+        <p:txBody>
+          <a:bodyPr lIns="82124" tIns="41061" rIns="82124" bIns="41061"/>
+          <a:lstStyle/>
+          <a:p>
+            <a:endParaRPr lang="de-DE"/>
+          </a:p>
+        </p:txBody>
+      </p:sp>
+      <p:sp>
+        <p:nvSpPr>
+          <p:cNvPr id="2062" name="Textfeld 2061"/>
+          <p:cNvSpPr txBox="1"/>
+          <p:nvPr/>
+        </p:nvSpPr>
+        <p:spPr>
+          <a:xfrm>
+            <a:off x="5962093" y="5637763"/>
+            <a:ext cx="574196" cy="769441"/>
+          </a:xfrm>
+          <a:prstGeom prst="rect">
+            <a:avLst/>
+          </a:prstGeom>
+          <a:noFill/>
+        </p:spPr>
+        <p:txBody>
+          <a:bodyPr wrap="none" rtlCol="0">
+            <a:spAutoFit/>
+          </a:bodyPr>
+          <a:lstStyle/>
+          <a:p>
+            <a:r>
+              <a:rPr lang="de-DE" sz="4400" dirty="0" smtClean="0"/>
+              <a:t>…</a:t>
+            </a:r>
+            <a:endParaRPr lang="de-DE" sz="4400" dirty="0"/>
+          </a:p>
+        </p:txBody>
+      </p:sp>
+      <p:pic>
+        <p:nvPicPr>
+          <p:cNvPr id="101" name="Picture 2" descr="https://image.freepik.com/free-icon/envelope-rectangular-outline-variant_318-46239.jpg"/>
+          <p:cNvPicPr>
+            <a:picLocks noChangeAspect="1" noChangeArrowheads="1"/>
+          </p:cNvPicPr>
+          <p:nvPr/>
+        </p:nvPicPr>
+        <p:blipFill>
+          <a:blip r:embed="rId5" cstate="print">
+            <a:extLst>
+              <a:ext uri="{28A0092B-C50C-407E-A947-70E740481C1C}">
+                <a14:useLocalDpi xmlns:a14="http://schemas.microsoft.com/office/drawing/2010/main" val="0"/>
+              </a:ext>
+            </a:extLst>
+          </a:blip>
+          <a:srcRect/>
+          <a:stretch>
+            <a:fillRect/>
+          </a:stretch>
+        </p:blipFill>
+        <p:spPr bwMode="auto">
+          <a:xfrm>
+            <a:off x="7555177" y="5157654"/>
+            <a:ext cx="375444" cy="375444"/>
+          </a:xfrm>
+          <a:prstGeom prst="rect">
+            <a:avLst/>
+          </a:prstGeom>
+          <a:noFill/>
+          <a:extLst>
+            <a:ext uri="{909E8E84-426E-40DD-AFC4-6F175D3DCCD1}">
+              <a14:hiddenFill xmlns:a14="http://schemas.microsoft.com/office/drawing/2010/main">
+                <a:solidFill>
+                  <a:srgbClr val="FFFFFF"/>
+                </a:solidFill>
+              </a14:hiddenFill>
+            </a:ext>
+          </a:extLst>
+        </p:spPr>
+      </p:pic>
+      <p:sp>
+        <p:nvSpPr>
+          <p:cNvPr id="102" name="Line 43"/>
+          <p:cNvSpPr>
+            <a:spLocks noChangeShapeType="1"/>
+          </p:cNvSpPr>
+          <p:nvPr/>
+        </p:nvSpPr>
+        <p:spPr bwMode="auto">
+          <a:xfrm flipH="1">
+            <a:off x="7459533" y="5157654"/>
+            <a:ext cx="191287" cy="0"/>
+          </a:xfrm>
+          <a:prstGeom prst="line">
+            <a:avLst/>
+          </a:prstGeom>
+          <a:noFill/>
+          <a:ln w="28575">
+            <a:solidFill>
+              <a:schemeClr val="tx1"/>
+            </a:solidFill>
+            <a:round/>
+            <a:headEnd/>
+            <a:tailEnd type="triangle" w="med" len="med"/>
+          </a:ln>
+          <a:extLst>
+            <a:ext uri="{909E8E84-426E-40DD-AFC4-6F175D3DCCD1}">
+              <a14:hiddenFill xmlns:a14="http://schemas.microsoft.com/office/drawing/2010/main">
+                <a:noFill/>
+              </a14:hiddenFill>
+            </a:ext>
+          </a:extLst>
+        </p:spPr>
+        <p:txBody>
+          <a:bodyPr lIns="82124" tIns="41061" rIns="82124" bIns="41061"/>
+          <a:lstStyle/>
+          <a:p>
+            <a:endParaRPr lang="de-DE"/>
+          </a:p>
+        </p:txBody>
+      </p:sp>
+      <p:sp>
+        <p:nvSpPr>
+          <p:cNvPr id="2063" name="&quot;Nein&quot;-Symbol 2062"/>
+          <p:cNvSpPr/>
+          <p:nvPr/>
+        </p:nvSpPr>
+        <p:spPr>
+          <a:xfrm>
+            <a:off x="7892760" y="5341270"/>
+            <a:ext cx="141402" cy="156217"/>
+          </a:xfrm>
+          <a:prstGeom prst="noSmoking">
+            <a:avLst/>
+          </a:prstGeom>
+          <a:solidFill>
+            <a:srgbClr val="FF0000"/>
+          </a:solidFill>
+          <a:ln>
+            <a:solidFill>
+              <a:srgbClr val="FF0000"/>
+            </a:solidFill>
+          </a:ln>
+        </p:spPr>
+        <p:style>
+          <a:lnRef idx="2">
+            <a:schemeClr val="accent1">
+              <a:shade val="50000"/>
+            </a:schemeClr>
+          </a:lnRef>
+          <a:fillRef idx="1">
+            <a:schemeClr val="accent1"/>
+          </a:fillRef>
+          <a:effectRef idx="0">
+            <a:schemeClr val="accent1"/>
+          </a:effectRef>
+          <a:fontRef idx="minor">
+            <a:schemeClr val="lt1"/>
+          </a:fontRef>
+        </p:style>
+        <p:txBody>
+          <a:bodyPr rtlCol="0" anchor="ctr"/>
+          <a:lstStyle/>
+          <a:p>
+            <a:pPr algn="ctr"/>
+            <a:endParaRPr lang="de-DE">
+              <a:solidFill>
+                <a:schemeClr val="tx1"/>
+              </a:solidFill>
+            </a:endParaRPr>
+          </a:p>
+        </p:txBody>
+      </p:sp>
+      <p:sp>
+        <p:nvSpPr>
+          <p:cNvPr id="103" name="Pfeil nach rechts 102"/>
+          <p:cNvSpPr/>
+          <p:nvPr/>
+        </p:nvSpPr>
+        <p:spPr>
+          <a:xfrm>
+            <a:off x="1543863" y="3944345"/>
+            <a:ext cx="488258" cy="314381"/>
+          </a:xfrm>
+          <a:prstGeom prst="rightArrow">
+            <a:avLst/>
+          </a:prstGeom>
+        </p:spPr>
+        <p:style>
+          <a:lnRef idx="2">
+            <a:schemeClr val="dk1">
+              <a:shade val="50000"/>
+            </a:schemeClr>
+          </a:lnRef>
+          <a:fillRef idx="1">
+            <a:schemeClr val="dk1"/>
+          </a:fillRef>
+          <a:effectRef idx="0">
+            <a:schemeClr val="dk1"/>
+          </a:effectRef>
+          <a:fontRef idx="minor">
+            <a:schemeClr val="lt1"/>
+          </a:fontRef>
+        </p:style>
+        <p:txBody>
+          <a:bodyPr rtlCol="0" anchor="ctr"/>
+          <a:lstStyle/>
+          <a:p>
+            <a:pPr algn="ctr"/>
+            <a:endParaRPr lang="de-DE"/>
+          </a:p>
+        </p:txBody>
+      </p:sp>
+      <p:sp>
+        <p:nvSpPr>
+          <p:cNvPr id="104" name="Textfeld 103"/>
+          <p:cNvSpPr txBox="1"/>
+          <p:nvPr/>
+        </p:nvSpPr>
+        <p:spPr>
+          <a:xfrm>
+            <a:off x="2392007" y="2168622"/>
+            <a:ext cx="1889876" cy="369332"/>
+          </a:xfrm>
+          <a:prstGeom prst="rect">
+            <a:avLst/>
+          </a:prstGeom>
+          <a:noFill/>
+        </p:spPr>
+        <p:txBody>
+          <a:bodyPr wrap="none" rtlCol="0">
+            <a:spAutoFit/>
+          </a:bodyPr>
+          <a:lstStyle/>
+          <a:p>
+            <a:r>
+              <a:rPr lang="de-DE" dirty="0" smtClean="0"/>
+              <a:t>Main-Task läuft an</a:t>
+            </a:r>
+          </a:p>
+        </p:txBody>
+      </p:sp>
+      <p:sp>
+        <p:nvSpPr>
+          <p:cNvPr id="105" name="Textfeld 104"/>
+          <p:cNvSpPr txBox="1"/>
+          <p:nvPr/>
+        </p:nvSpPr>
+        <p:spPr>
+          <a:xfrm>
+            <a:off x="4676012" y="2168622"/>
+            <a:ext cx="3254609" cy="369332"/>
+          </a:xfrm>
+          <a:prstGeom prst="rect">
+            <a:avLst/>
+          </a:prstGeom>
+          <a:noFill/>
+        </p:spPr>
+        <p:txBody>
+          <a:bodyPr wrap="none" rtlCol="0">
+            <a:spAutoFit/>
+          </a:bodyPr>
+          <a:lstStyle/>
+          <a:p>
+            <a:r>
+              <a:rPr lang="de-DE" dirty="0" smtClean="0"/>
+              <a:t>Client-Tasks pro Nutzer erzeugen</a:t>
+            </a:r>
+          </a:p>
+        </p:txBody>
+      </p:sp>
+      <p:pic>
+        <p:nvPicPr>
+          <p:cNvPr id="114" name="Picture 2" descr="https://image.freepik.com/free-icon/envelope-rectangular-outline-variant_318-46239.jpg"/>
+          <p:cNvPicPr>
+            <a:picLocks noChangeAspect="1" noChangeArrowheads="1"/>
+          </p:cNvPicPr>
+          <p:nvPr/>
+        </p:nvPicPr>
+        <p:blipFill>
+          <a:blip r:embed="rId5" cstate="print">
+            <a:extLst>
+              <a:ext uri="{28A0092B-C50C-407E-A947-70E740481C1C}">
+                <a14:useLocalDpi xmlns:a14="http://schemas.microsoft.com/office/drawing/2010/main" val="0"/>
+              </a:ext>
+            </a:extLst>
+          </a:blip>
+          <a:srcRect/>
+          <a:stretch>
+            <a:fillRect/>
+          </a:stretch>
+        </p:blipFill>
+        <p:spPr bwMode="auto">
+          <a:xfrm>
+            <a:off x="6974898" y="3386275"/>
+            <a:ext cx="375444" cy="375444"/>
+          </a:xfrm>
+          <a:prstGeom prst="rect">
+            <a:avLst/>
+          </a:prstGeom>
+          <a:noFill/>
+          <a:extLst>
+            <a:ext uri="{909E8E84-426E-40DD-AFC4-6F175D3DCCD1}">
+              <a14:hiddenFill xmlns:a14="http://schemas.microsoft.com/office/drawing/2010/main">
+                <a:solidFill>
+                  <a:srgbClr val="FFFFFF"/>
+                </a:solidFill>
+              </a14:hiddenFill>
+            </a:ext>
+          </a:extLst>
+        </p:spPr>
+      </p:pic>
+      <p:sp>
+        <p:nvSpPr>
+          <p:cNvPr id="115" name="Line 43"/>
+          <p:cNvSpPr>
+            <a:spLocks noChangeShapeType="1"/>
+          </p:cNvSpPr>
+          <p:nvPr/>
+        </p:nvSpPr>
+        <p:spPr bwMode="auto">
+          <a:xfrm flipH="1">
+            <a:off x="6879254" y="3386275"/>
+            <a:ext cx="191287" cy="0"/>
+          </a:xfrm>
+          <a:prstGeom prst="line">
+            <a:avLst/>
+          </a:prstGeom>
+          <a:noFill/>
+          <a:ln w="28575">
+            <a:solidFill>
+              <a:schemeClr val="tx1"/>
+            </a:solidFill>
+            <a:round/>
+            <a:headEnd/>
+            <a:tailEnd type="triangle" w="med" len="med"/>
+          </a:ln>
+          <a:extLst>
+            <a:ext uri="{909E8E84-426E-40DD-AFC4-6F175D3DCCD1}">
+              <a14:hiddenFill xmlns:a14="http://schemas.microsoft.com/office/drawing/2010/main">
+                <a:noFill/>
+              </a14:hiddenFill>
+            </a:ext>
+          </a:extLst>
+        </p:spPr>
+        <p:txBody>
+          <a:bodyPr lIns="82124" tIns="41061" rIns="82124" bIns="41061"/>
+          <a:lstStyle/>
+          <a:p>
+            <a:endParaRPr lang="de-DE"/>
+          </a:p>
+        </p:txBody>
+      </p:sp>
+      <p:sp>
+        <p:nvSpPr>
+          <p:cNvPr id="2065" name="Rad 2064"/>
+          <p:cNvSpPr/>
+          <p:nvPr/>
+        </p:nvSpPr>
+        <p:spPr>
+          <a:xfrm>
+            <a:off x="7318131" y="3572662"/>
+            <a:ext cx="141402" cy="140721"/>
+          </a:xfrm>
+          <a:prstGeom prst="donut">
+            <a:avLst/>
+          </a:prstGeom>
+          <a:solidFill>
+            <a:srgbClr val="00B050"/>
+          </a:solidFill>
+          <a:ln>
+            <a:solidFill>
+              <a:srgbClr val="00B050"/>
+            </a:solidFill>
+          </a:ln>
+        </p:spPr>
+        <p:style>
+          <a:lnRef idx="2">
+            <a:schemeClr val="accent1">
+              <a:shade val="50000"/>
+            </a:schemeClr>
+          </a:lnRef>
+          <a:fillRef idx="1">
+            <a:schemeClr val="accent1"/>
+          </a:fillRef>
+          <a:effectRef idx="0">
+            <a:schemeClr val="accent1"/>
+          </a:effectRef>
+          <a:fontRef idx="minor">
+            <a:schemeClr val="lt1"/>
+          </a:fontRef>
+        </p:style>
+        <p:txBody>
+          <a:bodyPr rtlCol="0" anchor="ctr"/>
+          <a:lstStyle/>
+          <a:p>
+            <a:pPr algn="ctr"/>
+            <a:endParaRPr lang="de-DE">
+              <a:ln>
+                <a:solidFill>
+                  <a:srgbClr val="00B050"/>
+                </a:solidFill>
+              </a:ln>
+              <a:solidFill>
+                <a:srgbClr val="00B050"/>
+              </a:solidFill>
+            </a:endParaRPr>
+          </a:p>
+        </p:txBody>
+      </p:sp>
+      <p:pic>
+        <p:nvPicPr>
+          <p:cNvPr id="2066" name="Picture 4" descr="Play 1 Hot icon"/>
+          <p:cNvPicPr>
+            <a:picLocks noChangeAspect="1" noChangeArrowheads="1"/>
+          </p:cNvPicPr>
+          <p:nvPr/>
+        </p:nvPicPr>
+        <p:blipFill>
+          <a:blip r:embed="rId6" cstate="print">
+            <a:extLst>
+              <a:ext uri="{28A0092B-C50C-407E-A947-70E740481C1C}">
+                <a14:useLocalDpi xmlns:a14="http://schemas.microsoft.com/office/drawing/2010/main" val="0"/>
+              </a:ext>
+            </a:extLst>
+          </a:blip>
+          <a:srcRect/>
+          <a:stretch>
+            <a:fillRect/>
+          </a:stretch>
+        </p:blipFill>
+        <p:spPr bwMode="auto">
+          <a:xfrm>
+            <a:off x="484461" y="3855134"/>
+            <a:ext cx="485448" cy="485448"/>
+          </a:xfrm>
+          <a:prstGeom prst="rect">
+            <a:avLst/>
+          </a:prstGeom>
+          <a:noFill/>
+          <a:extLst>
+            <a:ext uri="{909E8E84-426E-40DD-AFC4-6F175D3DCCD1}">
+              <a14:hiddenFill xmlns:a14="http://schemas.microsoft.com/office/drawing/2010/main">
+                <a:solidFill>
+                  <a:srgbClr val="FFFFFF"/>
+                </a:solidFill>
+              </a14:hiddenFill>
+            </a:ext>
+          </a:extLst>
+        </p:spPr>
+      </p:pic>
+    </p:spTree>
+    <p:extLst>
+      <p:ext uri="{BB962C8B-B14F-4D97-AF65-F5344CB8AC3E}">
+        <p14:creationId xmlns:p14="http://schemas.microsoft.com/office/powerpoint/2010/main" val="1187591999"/>
+      </p:ext>
+    </p:extLst>
+  </p:cSld>
+  <p:clrMapOvr>
+    <a:masterClrMapping/>
+  </p:clrMapOvr>
+  <p:timing>
+    <p:tnLst>
+      <p:par>
+        <p:cTn id="1" dur="indefinite" restart="never" nodeType="tmRoot"/>
+      </p:par>
+    </p:tnLst>
+  </p:timing>
+</p:sld>
+</file>
+
+<file path=ppt/slides/slide8.xml><?xml version="1.0" encoding="utf-8"?>
+<p:sld xmlns:a="http://schemas.openxmlformats.org/drawingml/2006/main" xmlns:r="http://schemas.openxmlformats.org/officeDocument/2006/relationships" xmlns:p="http://schemas.openxmlformats.org/presentationml/2006/main">
+  <p:cSld>
+    <p:spTree>
+      <p:nvGrpSpPr>
+        <p:cNvPr id="1" name=""/>
+        <p:cNvGrpSpPr/>
+        <p:nvPr/>
+      </p:nvGrpSpPr>
+      <p:grpSpPr>
+        <a:xfrm>
+          <a:off x="0" y="0"/>
+          <a:ext cx="0" cy="0"/>
+          <a:chOff x="0" y="0"/>
+          <a:chExt cx="0" cy="0"/>
+        </a:xfrm>
+      </p:grpSpPr>
+      <p:sp>
+        <p:nvSpPr>
+          <p:cNvPr id="2" name="Titel 1"/>
+          <p:cNvSpPr>
+            <a:spLocks noGrp="1"/>
+          </p:cNvSpPr>
+          <p:nvPr>
+            <p:ph type="title"/>
+          </p:nvPr>
+        </p:nvSpPr>
+        <p:spPr>
+          <a:xfrm>
+            <a:off x="360000" y="1317222"/>
+            <a:ext cx="8246118" cy="569556"/>
+          </a:xfrm>
+        </p:spPr>
+        <p:txBody>
+          <a:bodyPr/>
+          <a:lstStyle/>
+          <a:p>
+            <a:r>
+              <a:rPr lang="de-DE" dirty="0" smtClean="0"/>
+              <a:t>Anwendungspräsentation</a:t>
+            </a:r>
+            <a:endParaRPr lang="de-DE" dirty="0"/>
+          </a:p>
+        </p:txBody>
+      </p:sp>
+      <p:sp>
+        <p:nvSpPr>
+          <p:cNvPr id="3" name="Inhaltsplatzhalter 2"/>
+          <p:cNvSpPr>
+            <a:spLocks noGrp="1"/>
+          </p:cNvSpPr>
+          <p:nvPr>
+            <p:ph idx="1"/>
+          </p:nvPr>
+        </p:nvSpPr>
+        <p:spPr/>
+        <p:txBody>
+          <a:bodyPr/>
+          <a:lstStyle/>
+          <a:p>
+            <a:r>
+              <a:rPr lang="de-DE" dirty="0" smtClean="0"/>
+              <a:t>Server und Clients startklar, von unterschiedlichen Rechnern aus!</a:t>
+            </a:r>
+          </a:p>
+          <a:p>
+            <a:r>
+              <a:rPr lang="de-DE" dirty="0" smtClean="0"/>
+              <a:t>Funktionen demonstrieren </a:t>
+            </a:r>
+          </a:p>
+          <a:p>
+            <a:r>
+              <a:rPr lang="de-DE" dirty="0" smtClean="0"/>
+              <a:t>Wenn es um die Server Funktionen geht, Server auf Präsentationslaptop, wenn um die Client Funktionen extra Client </a:t>
+            </a:r>
+            <a:r>
+              <a:rPr lang="de-DE" dirty="0"/>
+              <a:t>F</a:t>
+            </a:r>
+            <a:r>
+              <a:rPr lang="de-DE" dirty="0" smtClean="0"/>
+              <a:t>enster auf diesem Laptop ansonsten kommt </a:t>
+            </a:r>
+            <a:r>
+              <a:rPr lang="de-DE" dirty="0"/>
+              <a:t>I</a:t>
+            </a:r>
+            <a:r>
+              <a:rPr lang="de-DE" dirty="0" smtClean="0"/>
+              <a:t>nput von außerhalb</a:t>
+            </a:r>
+            <a:endParaRPr lang="de-DE" dirty="0"/>
+          </a:p>
+        </p:txBody>
+      </p:sp>
+    </p:spTree>
+    <p:extLst>
+      <p:ext uri="{BB962C8B-B14F-4D97-AF65-F5344CB8AC3E}">
+        <p14:creationId xmlns:p14="http://schemas.microsoft.com/office/powerpoint/2010/main" val="3584050163"/>
+      </p:ext>
+    </p:extLst>
+  </p:cSld>
+  <p:clrMapOvr>
+    <a:masterClrMapping/>
+  </p:clrMapOvr>
+  <p:timing>
+    <p:tnLst>
+      <p:par>
+        <p:cTn id="1" dur="indefinite" restart="never" nodeType="tmRoot"/>
+      </p:par>
+    </p:tnLst>
+  </p:timing>
+</p:sld>
+</file>
+
+<file path=ppt/slides/slide9.xml><?xml version="1.0" encoding="utf-8"?>
+<p:sld xmlns:a="http://schemas.openxmlformats.org/drawingml/2006/main" xmlns:r="http://schemas.openxmlformats.org/officeDocument/2006/relationships" xmlns:p="http://schemas.openxmlformats.org/presentationml/2006/main">
+  <p:cSld>
+    <p:spTree>
+      <p:nvGrpSpPr>
+        <p:cNvPr id="1" name=""/>
+        <p:cNvGrpSpPr/>
+        <p:nvPr/>
+      </p:nvGrpSpPr>
+      <p:grpSpPr>
+        <a:xfrm>
+          <a:off x="0" y="0"/>
+          <a:ext cx="0" cy="0"/>
+          <a:chOff x="0" y="0"/>
+          <a:chExt cx="0" cy="0"/>
+        </a:xfrm>
+      </p:grpSpPr>
+      <p:sp>
+        <p:nvSpPr>
+          <p:cNvPr id="2" name="Titel 1"/>
+          <p:cNvSpPr>
+            <a:spLocks noGrp="1"/>
+          </p:cNvSpPr>
+          <p:nvPr>
+            <p:ph type="title"/>
+          </p:nvPr>
+        </p:nvSpPr>
+        <p:spPr>
+          <a:xfrm>
+            <a:off x="360000" y="1317222"/>
+            <a:ext cx="8246118" cy="569556"/>
+          </a:xfrm>
+        </p:spPr>
+        <p:txBody>
+          <a:bodyPr/>
+          <a:lstStyle/>
+          <a:p>
+            <a:r>
+              <a:rPr lang="de-DE" dirty="0" smtClean="0"/>
+              <a:t>Erweiterbarkeit</a:t>
+            </a:r>
+            <a:endParaRPr lang="de-DE" dirty="0"/>
+          </a:p>
+        </p:txBody>
+      </p:sp>
+      <p:sp>
+        <p:nvSpPr>
+          <p:cNvPr id="3" name="Inhaltsplatzhalter 2"/>
+          <p:cNvSpPr>
+            <a:spLocks noGrp="1"/>
+          </p:cNvSpPr>
+          <p:nvPr>
+            <p:ph idx="1"/>
+          </p:nvPr>
+        </p:nvSpPr>
+        <p:spPr/>
+        <p:txBody>
+          <a:bodyPr/>
+          <a:lstStyle/>
+          <a:p>
+            <a:r>
+              <a:rPr lang="de-DE" dirty="0" smtClean="0"/>
+              <a:t>Protokoll leicht erweiterbar durch Typen</a:t>
+            </a:r>
+          </a:p>
+          <a:p>
+            <a:r>
+              <a:rPr lang="de-DE" dirty="0" smtClean="0"/>
+              <a:t>Ideen nennen, </a:t>
+            </a:r>
+            <a:r>
+              <a:rPr lang="de-DE" dirty="0" err="1" smtClean="0"/>
+              <a:t>z.b.</a:t>
+            </a:r>
+            <a:r>
+              <a:rPr lang="de-DE" dirty="0" smtClean="0"/>
+              <a:t> </a:t>
+            </a:r>
+            <a:r>
+              <a:rPr lang="de-DE" dirty="0" err="1" smtClean="0"/>
+              <a:t>Smiles</a:t>
+            </a:r>
+            <a:r>
+              <a:rPr lang="de-DE" dirty="0" smtClean="0"/>
+              <a:t>, </a:t>
+            </a:r>
+            <a:r>
+              <a:rPr lang="de-DE" dirty="0" err="1" smtClean="0"/>
+              <a:t>History</a:t>
+            </a:r>
+            <a:r>
+              <a:rPr lang="de-DE" dirty="0" smtClean="0"/>
+              <a:t> Log, Spiele wie in </a:t>
+            </a:r>
+            <a:r>
+              <a:rPr lang="de-DE" dirty="0" err="1" smtClean="0"/>
+              <a:t>ClientGUI</a:t>
+            </a:r>
+            <a:r>
+              <a:rPr lang="de-DE" dirty="0" smtClean="0"/>
+              <a:t> schon zu sehen</a:t>
+            </a:r>
+            <a:endParaRPr lang="de-DE" dirty="0"/>
+          </a:p>
+        </p:txBody>
+      </p:sp>
+    </p:spTree>
+    <p:extLst>
+      <p:ext uri="{BB962C8B-B14F-4D97-AF65-F5344CB8AC3E}">
+        <p14:creationId xmlns:p14="http://schemas.microsoft.com/office/powerpoint/2010/main" val="2380641263"/>
+      </p:ext>
+    </p:extLst>
+  </p:cSld>
+  <p:clrMapOvr>
+    <a:masterClrMapping/>
+  </p:clrMapOvr>
+  <p:timing>
+    <p:tnLst>
+      <p:par>
+        <p:cTn id="1" dur="indefinite" restart="never" nodeType="tmRoot"/>
+      </p:par>
+    </p:tnLst>
+  </p:timing>
 </p:sld>
 </file>
 
@@ -1829,4 +6147,265 @@
     </a:ext>
   </a:extLst>
 </a:theme>
+</file>
+
+<file path=ppt/theme/theme2.xml><?xml version="1.0" encoding="utf-8"?>
+<a:theme xmlns:a="http://schemas.openxmlformats.org/drawingml/2006/main" name="Office Theme">
+  <a:themeElements>
+    <a:clrScheme name="Office">
+      <a:dk1>
+        <a:sysClr val="windowText" lastClr="000000"/>
+      </a:dk1>
+      <a:lt1>
+        <a:sysClr val="window" lastClr="FFFFFF"/>
+      </a:lt1>
+      <a:dk2>
+        <a:srgbClr val="44546A"/>
+      </a:dk2>
+      <a:lt2>
+        <a:srgbClr val="E7E6E6"/>
+      </a:lt2>
+      <a:accent1>
+        <a:srgbClr val="5B9BD5"/>
+      </a:accent1>
+      <a:accent2>
+        <a:srgbClr val="ED7D31"/>
+      </a:accent2>
+      <a:accent3>
+        <a:srgbClr val="A5A5A5"/>
+      </a:accent3>
+      <a:accent4>
+        <a:srgbClr val="FFC000"/>
+      </a:accent4>
+      <a:accent5>
+        <a:srgbClr val="4472C4"/>
+      </a:accent5>
+      <a:accent6>
+        <a:srgbClr val="70AD47"/>
+      </a:accent6>
+      <a:hlink>
+        <a:srgbClr val="0563C1"/>
+      </a:hlink>
+      <a:folHlink>
+        <a:srgbClr val="954F72"/>
+      </a:folHlink>
+    </a:clrScheme>
+    <a:fontScheme name="Office">
+      <a:majorFont>
+        <a:latin typeface="Calibri Light" panose="020F0302020204030204"/>
+        <a:ea typeface=""/>
+        <a:cs typeface=""/>
+        <a:font script="Jpan" typeface="ＭＳ Ｐゴシック"/>
+        <a:font script="Hang" typeface="맑은 고딕"/>
+        <a:font script="Hans" typeface="宋体"/>
+        <a:font script="Hant" typeface="新細明體"/>
+        <a:font script="Arab" typeface="Times New Roman"/>
+        <a:font script="Hebr" typeface="Times New Roman"/>
+        <a:font script="Thai" typeface="Angsana New"/>
+        <a:font script="Ethi" typeface="Nyala"/>
+        <a:font script="Beng" typeface="Vrinda"/>
+        <a:font script="Gujr" typeface="Shruti"/>
+        <a:font script="Khmr" typeface="MoolBoran"/>
+        <a:font script="Knda" typeface="Tunga"/>
+        <a:font script="Guru" typeface="Raavi"/>
+        <a:font script="Cans" typeface="Euphemia"/>
+        <a:font script="Cher" typeface="Plantagenet Cherokee"/>
+        <a:font script="Yiii" typeface="Microsoft Yi Baiti"/>
+        <a:font script="Tibt" typeface="Microsoft Himalaya"/>
+        <a:font script="Thaa" typeface="MV Boli"/>
+        <a:font script="Deva" typeface="Mangal"/>
+        <a:font script="Telu" typeface="Gautami"/>
+        <a:font script="Taml" typeface="Latha"/>
+        <a:font script="Syrc" typeface="Estrangelo Edessa"/>
+        <a:font script="Orya" typeface="Kalinga"/>
+        <a:font script="Mlym" typeface="Kartika"/>
+        <a:font script="Laoo" typeface="DokChampa"/>
+        <a:font script="Sinh" typeface="Iskoola Pota"/>
+        <a:font script="Mong" typeface="Mongolian Baiti"/>
+        <a:font script="Viet" typeface="Times New Roman"/>
+        <a:font script="Uigh" typeface="Microsoft Uighur"/>
+        <a:font script="Geor" typeface="Sylfaen"/>
+      </a:majorFont>
+      <a:minorFont>
+        <a:latin typeface="Calibri" panose="020F0502020204030204"/>
+        <a:ea typeface=""/>
+        <a:cs typeface=""/>
+        <a:font script="Jpan" typeface="ＭＳ Ｐゴシック"/>
+        <a:font script="Hang" typeface="맑은 고딕"/>
+        <a:font script="Hans" typeface="宋体"/>
+        <a:font script="Hant" typeface="新細明體"/>
+        <a:font script="Arab" typeface="Arial"/>
+        <a:font script="Hebr" typeface="Arial"/>
+        <a:font script="Thai" typeface="Cordia New"/>
+        <a:font script="Ethi" typeface="Nyala"/>
+        <a:font script="Beng" typeface="Vrinda"/>
+        <a:font script="Gujr" typeface="Shruti"/>
+        <a:font script="Khmr" typeface="DaunPenh"/>
+        <a:font script="Knda" typeface="Tunga"/>
+        <a:font script="Guru" typeface="Raavi"/>
+        <a:font script="Cans" typeface="Euphemia"/>
+        <a:font script="Cher" typeface="Plantagenet Cherokee"/>
+        <a:font script="Yiii" typeface="Microsoft Yi Baiti"/>
+        <a:font script="Tibt" typeface="Microsoft Himalaya"/>
+        <a:font script="Thaa" typeface="MV Boli"/>
+        <a:font script="Deva" typeface="Mangal"/>
+        <a:font script="Telu" typeface="Gautami"/>
+        <a:font script="Taml" typeface="Latha"/>
+        <a:font script="Syrc" typeface="Estrangelo Edessa"/>
+        <a:font script="Orya" typeface="Kalinga"/>
+        <a:font script="Mlym" typeface="Kartika"/>
+        <a:font script="Laoo" typeface="DokChampa"/>
+        <a:font script="Sinh" typeface="Iskoola Pota"/>
+        <a:font script="Mong" typeface="Mongolian Baiti"/>
+        <a:font script="Viet" typeface="Arial"/>
+        <a:font script="Uigh" typeface="Microsoft Uighur"/>
+        <a:font script="Geor" typeface="Sylfaen"/>
+      </a:minorFont>
+    </a:fontScheme>
+    <a:fmtScheme name="Office">
+      <a:fillStyleLst>
+        <a:solidFill>
+          <a:schemeClr val="phClr"/>
+        </a:solidFill>
+        <a:gradFill rotWithShape="1">
+          <a:gsLst>
+            <a:gs pos="0">
+              <a:schemeClr val="phClr">
+                <a:lumMod val="110000"/>
+                <a:satMod val="105000"/>
+                <a:tint val="67000"/>
+              </a:schemeClr>
+            </a:gs>
+            <a:gs pos="50000">
+              <a:schemeClr val="phClr">
+                <a:lumMod val="105000"/>
+                <a:satMod val="103000"/>
+                <a:tint val="73000"/>
+              </a:schemeClr>
+            </a:gs>
+            <a:gs pos="100000">
+              <a:schemeClr val="phClr">
+                <a:lumMod val="105000"/>
+                <a:satMod val="109000"/>
+                <a:tint val="81000"/>
+              </a:schemeClr>
+            </a:gs>
+          </a:gsLst>
+          <a:lin ang="5400000" scaled="0"/>
+        </a:gradFill>
+        <a:gradFill rotWithShape="1">
+          <a:gsLst>
+            <a:gs pos="0">
+              <a:schemeClr val="phClr">
+                <a:satMod val="103000"/>
+                <a:lumMod val="102000"/>
+                <a:tint val="94000"/>
+              </a:schemeClr>
+            </a:gs>
+            <a:gs pos="50000">
+              <a:schemeClr val="phClr">
+                <a:satMod val="110000"/>
+                <a:lumMod val="100000"/>
+                <a:shade val="100000"/>
+              </a:schemeClr>
+            </a:gs>
+            <a:gs pos="100000">
+              <a:schemeClr val="phClr">
+                <a:lumMod val="99000"/>
+                <a:satMod val="120000"/>
+                <a:shade val="78000"/>
+              </a:schemeClr>
+            </a:gs>
+          </a:gsLst>
+          <a:lin ang="5400000" scaled="0"/>
+        </a:gradFill>
+      </a:fillStyleLst>
+      <a:lnStyleLst>
+        <a:ln w="6350" cap="flat" cmpd="sng" algn="ctr">
+          <a:solidFill>
+            <a:schemeClr val="phClr"/>
+          </a:solidFill>
+          <a:prstDash val="solid"/>
+          <a:miter lim="800000"/>
+        </a:ln>
+        <a:ln w="12700" cap="flat" cmpd="sng" algn="ctr">
+          <a:solidFill>
+            <a:schemeClr val="phClr"/>
+          </a:solidFill>
+          <a:prstDash val="solid"/>
+          <a:miter lim="800000"/>
+        </a:ln>
+        <a:ln w="19050" cap="flat" cmpd="sng" algn="ctr">
+          <a:solidFill>
+            <a:schemeClr val="phClr"/>
+          </a:solidFill>
+          <a:prstDash val="solid"/>
+          <a:miter lim="800000"/>
+        </a:ln>
+      </a:lnStyleLst>
+      <a:effectStyleLst>
+        <a:effectStyle>
+          <a:effectLst/>
+        </a:effectStyle>
+        <a:effectStyle>
+          <a:effectLst/>
+        </a:effectStyle>
+        <a:effectStyle>
+          <a:effectLst>
+            <a:outerShdw blurRad="57150" dist="19050" dir="5400000" algn="ctr" rotWithShape="0">
+              <a:srgbClr val="000000">
+                <a:alpha val="63000"/>
+              </a:srgbClr>
+            </a:outerShdw>
+          </a:effectLst>
+        </a:effectStyle>
+      </a:effectStyleLst>
+      <a:bgFillStyleLst>
+        <a:solidFill>
+          <a:schemeClr val="phClr"/>
+        </a:solidFill>
+        <a:solidFill>
+          <a:schemeClr val="phClr">
+            <a:tint val="95000"/>
+            <a:satMod val="170000"/>
+          </a:schemeClr>
+        </a:solidFill>
+        <a:gradFill rotWithShape="1">
+          <a:gsLst>
+            <a:gs pos="0">
+              <a:schemeClr val="phClr">
+                <a:tint val="93000"/>
+                <a:satMod val="150000"/>
+                <a:shade val="98000"/>
+                <a:lumMod val="102000"/>
+              </a:schemeClr>
+            </a:gs>
+            <a:gs pos="50000">
+              <a:schemeClr val="phClr">
+                <a:tint val="98000"/>
+                <a:satMod val="130000"/>
+                <a:shade val="90000"/>
+                <a:lumMod val="103000"/>
+              </a:schemeClr>
+            </a:gs>
+            <a:gs pos="100000">
+              <a:schemeClr val="phClr">
+                <a:shade val="63000"/>
+                <a:satMod val="120000"/>
+              </a:schemeClr>
+            </a:gs>
+          </a:gsLst>
+          <a:lin ang="5400000" scaled="0"/>
+        </a:gradFill>
+      </a:bgFillStyleLst>
+    </a:fmtScheme>
+  </a:themeElements>
+  <a:objectDefaults/>
+  <a:extraClrSchemeLst/>
+  <a:extLst>
+    <a:ext uri="{05A4C25C-085E-4340-85A3-A5531E510DB2}">
+      <thm15:themeFamily xmlns:thm15="http://schemas.microsoft.com/office/thememl/2012/main" name="Office Theme" id="{62F939B6-93AF-4DB8-9C6B-D6C7DFDC589F}" vid="{4A3C46E8-61CC-4603-A589-7422A47A8E4A}"/>
+    </a:ext>
+  </a:extLst>
+</a:theme>
 </file>
</xml_diff>

<commit_message>
Titel bei ZA angepasst
</commit_message>
<xml_diff>
--- a/documentation/Ada Chat.pptx
+++ b/documentation/Ada Chat.pptx
@@ -2063,10 +2063,9 @@
           <a:lstStyle/>
           <a:p>
             <a:r>
-              <a:rPr lang="de-DE" dirty="0" smtClean="0"/>
-              <a:t>Implementierungslogik – anderes Wort finden</a:t>
-            </a:r>
-            <a:endParaRPr lang="de-DE" dirty="0"/>
+              <a:rPr lang="de-DE" dirty="0"/>
+              <a:t>Zirkuläre Abhängigkeiten</a:t>
+            </a:r>
           </a:p>
         </p:txBody>
       </p:sp>
@@ -2826,10 +2825,9 @@
           <a:lstStyle/>
           <a:p>
             <a:r>
-              <a:rPr lang="de-DE" dirty="0" smtClean="0"/>
-              <a:t>Implementierungslogik – anderes Wort finden</a:t>
-            </a:r>
-            <a:endParaRPr lang="de-DE" dirty="0"/>
+              <a:rPr lang="de-DE" dirty="0"/>
+              <a:t>Zirkuläre Abhängigkeiten</a:t>
+            </a:r>
           </a:p>
         </p:txBody>
       </p:sp>
@@ -3279,10 +3277,9 @@
           <a:lstStyle/>
           <a:p>
             <a:r>
-              <a:rPr lang="de-DE" dirty="0" smtClean="0"/>
-              <a:t>Implementierungslogik – anderes Wort finden</a:t>
-            </a:r>
-            <a:endParaRPr lang="de-DE" dirty="0"/>
+              <a:rPr lang="de-DE" dirty="0"/>
+              <a:t>Zirkuläre Abhängigkeiten</a:t>
+            </a:r>
           </a:p>
         </p:txBody>
       </p:sp>
@@ -4049,10 +4046,9 @@
           <a:lstStyle/>
           <a:p>
             <a:r>
-              <a:rPr lang="de-DE" dirty="0" smtClean="0"/>
-              <a:t>Implementierungslogik – anderes Wort finden</a:t>
-            </a:r>
-            <a:endParaRPr lang="de-DE" dirty="0"/>
+              <a:rPr lang="de-DE" dirty="0"/>
+              <a:t>Zirkuläre Abhängigkeiten</a:t>
+            </a:r>
           </a:p>
         </p:txBody>
       </p:sp>
@@ -4849,10 +4845,9 @@
           <a:lstStyle/>
           <a:p>
             <a:r>
-              <a:rPr lang="de-DE" dirty="0" smtClean="0"/>
-              <a:t>Implementierungslogik – anderes Wort finden</a:t>
-            </a:r>
-            <a:endParaRPr lang="de-DE" dirty="0"/>
+              <a:rPr lang="de-DE" dirty="0"/>
+              <a:t>Zirkuläre Abhängigkeiten</a:t>
+            </a:r>
           </a:p>
         </p:txBody>
       </p:sp>
@@ -5690,10 +5685,9 @@
           <a:lstStyle/>
           <a:p>
             <a:r>
-              <a:rPr lang="de-DE" dirty="0" smtClean="0"/>
-              <a:t>Implementierungslogik – anderes Wort finden</a:t>
-            </a:r>
-            <a:endParaRPr lang="de-DE" dirty="0"/>
+              <a:rPr lang="de-DE" dirty="0"/>
+              <a:t>Zirkuläre Abhängigkeiten</a:t>
+            </a:r>
           </a:p>
         </p:txBody>
       </p:sp>
@@ -6572,10 +6566,9 @@
           <a:lstStyle/>
           <a:p>
             <a:r>
-              <a:rPr lang="de-DE" dirty="0" smtClean="0"/>
-              <a:t>Implementierungslogik – anderes Wort finden</a:t>
-            </a:r>
-            <a:endParaRPr lang="de-DE" dirty="0"/>
+              <a:rPr lang="de-DE" dirty="0"/>
+              <a:t>Zirkuläre Abhängigkeiten</a:t>
+            </a:r>
           </a:p>
         </p:txBody>
       </p:sp>
@@ -7420,10 +7413,9 @@
           <a:lstStyle/>
           <a:p>
             <a:r>
-              <a:rPr lang="de-DE" dirty="0" smtClean="0"/>
-              <a:t>Implementierungslogik – anderes Wort finden</a:t>
-            </a:r>
-            <a:endParaRPr lang="de-DE" dirty="0"/>
+              <a:rPr lang="de-DE" dirty="0"/>
+              <a:t>Zirkuläre Abhängigkeiten</a:t>
+            </a:r>
           </a:p>
         </p:txBody>
       </p:sp>
@@ -8276,10 +8268,9 @@
           <a:lstStyle/>
           <a:p>
             <a:r>
-              <a:rPr lang="de-DE" dirty="0" smtClean="0"/>
-              <a:t>Implementierungslogik – anderes Wort finden</a:t>
-            </a:r>
-            <a:endParaRPr lang="de-DE" dirty="0"/>
+              <a:rPr lang="de-DE" dirty="0"/>
+              <a:t>Zirkuläre Abhängigkeiten</a:t>
+            </a:r>
           </a:p>
         </p:txBody>
       </p:sp>
@@ -9230,10 +9221,9 @@
           <a:lstStyle/>
           <a:p>
             <a:r>
-              <a:rPr lang="de-DE" dirty="0" smtClean="0"/>
-              <a:t>Implementierungslogik – anderes Wort finden</a:t>
-            </a:r>
-            <a:endParaRPr lang="de-DE" dirty="0"/>
+              <a:rPr lang="de-DE" dirty="0"/>
+              <a:t>Zirkuläre Abhängigkeiten</a:t>
+            </a:r>
           </a:p>
         </p:txBody>
       </p:sp>
@@ -12815,28 +12805,6 @@
             <a:r>
               <a:rPr lang="de-DE" dirty="0" smtClean="0"/>
               <a:t>Zirkuläre Abhängigkeiten</a:t>
-            </a:r>
-          </a:p>
-          <a:p>
-            <a:r>
-              <a:rPr lang="de-DE" dirty="0" smtClean="0"/>
-              <a:t>Pointer Verhalten unklar, wann Call </a:t>
-            </a:r>
-            <a:r>
-              <a:rPr lang="de-DE" dirty="0" err="1" smtClean="0"/>
-              <a:t>by</a:t>
-            </a:r>
-            <a:r>
-              <a:rPr lang="de-DE" dirty="0" smtClean="0"/>
-              <a:t> Value wann Call </a:t>
-            </a:r>
-            <a:r>
-              <a:rPr lang="de-DE" dirty="0" err="1" smtClean="0"/>
-              <a:t>by</a:t>
-            </a:r>
-            <a:r>
-              <a:rPr lang="de-DE" dirty="0" smtClean="0"/>
-              <a:t> Reference </a:t>
             </a:r>
           </a:p>
           <a:p>

</xml_diff>

<commit_message>
dont worry be happy
</commit_message>
<xml_diff>
--- a/documentation/Ada Chat.pptx
+++ b/documentation/Ada Chat.pptx
@@ -5,7 +5,7 @@
     <p:sldMasterId id="2147483648" r:id="rId1"/>
   </p:sldMasterIdLst>
   <p:notesMasterIdLst>
-    <p:notesMasterId r:id="rId23"/>
+    <p:notesMasterId r:id="rId24"/>
   </p:notesMasterIdLst>
   <p:sldIdLst>
     <p:sldId id="256" r:id="rId2"/>
@@ -29,6 +29,7 @@
     <p:sldId id="272" r:id="rId20"/>
     <p:sldId id="273" r:id="rId21"/>
     <p:sldId id="274" r:id="rId22"/>
+    <p:sldId id="279" r:id="rId23"/>
   </p:sldIdLst>
   <p:sldSz cx="9144000" cy="6858000" type="screen4x3"/>
   <p:notesSz cx="6858000" cy="9144000"/>
@@ -9169,6 +9170,39 @@
           </a:p>
         </p:txBody>
       </p:sp>
+      <p:pic>
+        <p:nvPicPr>
+          <p:cNvPr id="4" name="Grafik 12"/>
+          <p:cNvPicPr>
+            <a:picLocks noChangeAspect="1"/>
+          </p:cNvPicPr>
+          <p:nvPr/>
+        </p:nvPicPr>
+        <p:blipFill>
+          <a:blip r:embed="rId2" cstate="print">
+            <a:extLst>
+              <a:ext uri="{28A0092B-C50C-407E-A947-70E740481C1C}">
+                <a14:useLocalDpi xmlns:a14="http://schemas.microsoft.com/office/drawing/2010/main" val="0"/>
+              </a:ext>
+            </a:extLst>
+          </a:blip>
+          <a:stretch>
+            <a:fillRect/>
+          </a:stretch>
+        </p:blipFill>
+        <p:spPr>
+          <a:xfrm>
+            <a:off x="7444307" y="4844132"/>
+            <a:ext cx="1584176" cy="1579610"/>
+          </a:xfrm>
+          <a:prstGeom prst="rect">
+            <a:avLst/>
+          </a:prstGeom>
+          <a:effectLst>
+            <a:softEdge rad="127000"/>
+          </a:effectLst>
+        </p:spPr>
+      </p:pic>
     </p:spTree>
     <p:extLst>
       <p:ext uri="{BB962C8B-B14F-4D97-AF65-F5344CB8AC3E}">
@@ -11054,6 +11088,105 @@
     <p:extLst>
       <p:ext uri="{BB962C8B-B14F-4D97-AF65-F5344CB8AC3E}">
         <p14:creationId xmlns:p14="http://schemas.microsoft.com/office/powerpoint/2010/main" val="3805318814"/>
+      </p:ext>
+    </p:extLst>
+  </p:cSld>
+  <p:clrMapOvr>
+    <a:masterClrMapping/>
+  </p:clrMapOvr>
+</p:sld>
+</file>
+
+<file path=ppt/slides/slide22.xml><?xml version="1.0" encoding="utf-8"?>
+<p:sld xmlns:a="http://schemas.openxmlformats.org/drawingml/2006/main" xmlns:r="http://schemas.openxmlformats.org/officeDocument/2006/relationships" xmlns:p="http://schemas.openxmlformats.org/presentationml/2006/main">
+  <p:cSld>
+    <p:spTree>
+      <p:nvGrpSpPr>
+        <p:cNvPr id="1" name=""/>
+        <p:cNvGrpSpPr/>
+        <p:nvPr/>
+      </p:nvGrpSpPr>
+      <p:grpSpPr>
+        <a:xfrm>
+          <a:off x="0" y="0"/>
+          <a:ext cx="0" cy="0"/>
+          <a:chOff x="0" y="0"/>
+          <a:chExt cx="0" cy="0"/>
+        </a:xfrm>
+      </p:grpSpPr>
+      <p:sp>
+        <p:nvSpPr>
+          <p:cNvPr id="2" name="Titel 1"/>
+          <p:cNvSpPr>
+            <a:spLocks noGrp="1"/>
+          </p:cNvSpPr>
+          <p:nvPr>
+            <p:ph type="title"/>
+          </p:nvPr>
+        </p:nvSpPr>
+        <p:spPr>
+          <a:xfrm>
+            <a:off x="360000" y="1317222"/>
+            <a:ext cx="8246118" cy="569556"/>
+          </a:xfrm>
+        </p:spPr>
+        <p:txBody>
+          <a:bodyPr/>
+          <a:lstStyle/>
+          <a:p>
+            <a:r>
+              <a:rPr lang="de-DE" dirty="0" smtClean="0"/>
+              <a:t>Compilerfehler</a:t>
+            </a:r>
+            <a:endParaRPr lang="de-DE" dirty="0"/>
+          </a:p>
+        </p:txBody>
+      </p:sp>
+      <p:pic>
+        <p:nvPicPr>
+          <p:cNvPr id="2050" name="Picture 2" descr="http://img20.dreamies.de/img/687/b/2hw3amslczl.jpg"/>
+          <p:cNvPicPr>
+            <a:picLocks noChangeAspect="1" noChangeArrowheads="1"/>
+          </p:cNvPicPr>
+          <p:nvPr/>
+        </p:nvPicPr>
+        <p:blipFill>
+          <a:blip r:embed="rId2">
+            <a:extLst>
+              <a:ext uri="{28A0092B-C50C-407E-A947-70E740481C1C}">
+                <a14:useLocalDpi xmlns:a14="http://schemas.microsoft.com/office/drawing/2010/main" val="0"/>
+              </a:ext>
+            </a:extLst>
+          </a:blip>
+          <a:srcRect/>
+          <a:stretch>
+            <a:fillRect/>
+          </a:stretch>
+        </p:blipFill>
+        <p:spPr bwMode="auto">
+          <a:xfrm>
+            <a:off x="2835234" y="2337291"/>
+            <a:ext cx="3295650" cy="3295651"/>
+          </a:xfrm>
+          <a:prstGeom prst="rect">
+            <a:avLst/>
+          </a:prstGeom>
+          <a:noFill/>
+          <a:extLst>
+            <a:ext uri="{909E8E84-426E-40DD-AFC4-6F175D3DCCD1}">
+              <a14:hiddenFill xmlns:a14="http://schemas.microsoft.com/office/drawing/2010/main">
+                <a:solidFill>
+                  <a:srgbClr val="FFFFFF"/>
+                </a:solidFill>
+              </a14:hiddenFill>
+            </a:ext>
+          </a:extLst>
+        </p:spPr>
+      </p:pic>
+    </p:spTree>
+    <p:extLst>
+      <p:ext uri="{BB962C8B-B14F-4D97-AF65-F5344CB8AC3E}">
+        <p14:creationId xmlns:p14="http://schemas.microsoft.com/office/powerpoint/2010/main" val="400358187"/>
       </p:ext>
     </p:extLst>
   </p:cSld>
@@ -11371,6 +11504,14 @@
   <p:clrMapOvr>
     <a:masterClrMapping/>
   </p:clrMapOvr>
+  <mc:AlternateContent xmlns:mc="http://schemas.openxmlformats.org/markup-compatibility/2006">
+    <mc:Choice xmlns:p14="http://schemas.microsoft.com/office/powerpoint/2010/main" Requires="p14">
+      <p:transition spd="slow" p14:dur="2000"/>
+    </mc:Choice>
+    <mc:Fallback>
+      <p:transition spd="slow"/>
+    </mc:Fallback>
+  </mc:AlternateContent>
 </p:sld>
 </file>
 
@@ -11515,9 +11656,10 @@
           <a:lstStyle/>
           <a:p>
             <a:r>
-              <a:rPr lang="de-DE" dirty="0"/>
-              <a:t>Implementierungslogik – anderes Wort finden</a:t>
-            </a:r>
+              <a:rPr lang="de-DE" dirty="0" smtClean="0"/>
+              <a:t>Implementierungslogik</a:t>
+            </a:r>
+            <a:endParaRPr lang="de-DE" dirty="0"/>
           </a:p>
         </p:txBody>
       </p:sp>
@@ -13302,9 +13444,10 @@
           <a:lstStyle/>
           <a:p>
             <a:r>
-              <a:rPr lang="de-DE" dirty="0"/>
-              <a:t>Implementierungslogik – anderes Wort finden</a:t>
-            </a:r>
+              <a:rPr lang="de-DE" dirty="0" smtClean="0"/>
+              <a:t>Implementierungslogik</a:t>
+            </a:r>
+            <a:endParaRPr lang="de-DE" dirty="0"/>
           </a:p>
         </p:txBody>
       </p:sp>
@@ -13390,7 +13533,7 @@
         </p:blipFill>
         <p:spPr bwMode="auto">
           <a:xfrm>
-            <a:off x="5179180" y="3263074"/>
+            <a:off x="4837021" y="3856220"/>
             <a:ext cx="375444" cy="375444"/>
           </a:xfrm>
           <a:prstGeom prst="rect">
@@ -13431,7 +13574,7 @@
         </p:blipFill>
         <p:spPr bwMode="auto">
           <a:xfrm>
-            <a:off x="5179180" y="3653553"/>
+            <a:off x="4837021" y="4246699"/>
             <a:ext cx="375444" cy="375444"/>
           </a:xfrm>
           <a:prstGeom prst="rect">
@@ -13459,7 +13602,7 @@
         </p:nvSpPr>
         <p:spPr bwMode="auto">
           <a:xfrm>
-            <a:off x="5092893" y="3655729"/>
+            <a:off x="4750734" y="4248875"/>
             <a:ext cx="181930" cy="0"/>
           </a:xfrm>
           <a:prstGeom prst="line">
@@ -13500,7 +13643,7 @@
         </p:nvSpPr>
         <p:spPr bwMode="auto">
           <a:xfrm flipH="1">
-            <a:off x="5083536" y="3263074"/>
+            <a:off x="4741377" y="3856220"/>
             <a:ext cx="191287" cy="0"/>
           </a:xfrm>
           <a:prstGeom prst="line">
@@ -13623,7 +13766,7 @@
         </p:blipFill>
         <p:spPr bwMode="auto">
           <a:xfrm>
-            <a:off x="4598901" y="3261988"/>
+            <a:off x="4256742" y="3855134"/>
             <a:ext cx="375444" cy="375444"/>
           </a:xfrm>
           <a:prstGeom prst="rect">
@@ -13651,7 +13794,7 @@
         </p:nvSpPr>
         <p:spPr bwMode="auto">
           <a:xfrm flipH="1">
-            <a:off x="4503257" y="3261988"/>
+            <a:off x="4161098" y="3855134"/>
             <a:ext cx="191287" cy="0"/>
           </a:xfrm>
           <a:prstGeom prst="line">
@@ -13690,7 +13833,7 @@
         </p:nvSpPr>
         <p:spPr>
           <a:xfrm>
-            <a:off x="4942134" y="3448375"/>
+            <a:off x="4599975" y="4041521"/>
             <a:ext cx="141402" cy="140721"/>
           </a:xfrm>
           <a:prstGeom prst="donut">
@@ -13837,25 +13980,77 @@
           </a:p>
         </p:txBody>
       </p:sp>
-      <p:sp>
-        <p:nvSpPr>
-          <p:cNvPr id="3" name="Inhaltsplatzhalter 2"/>
-          <p:cNvSpPr>
-            <a:spLocks noGrp="1"/>
-          </p:cNvSpPr>
-          <p:nvPr>
-            <p:ph idx="1"/>
-          </p:nvPr>
-        </p:nvSpPr>
-        <p:spPr/>
-        <p:txBody>
-          <a:bodyPr/>
-          <a:lstStyle/>
-          <a:p>
-            <a:endParaRPr lang="de-DE" dirty="0"/>
-          </a:p>
-        </p:txBody>
-      </p:sp>
+      <p:pic>
+        <p:nvPicPr>
+          <p:cNvPr id="1026" name="Picture 2" descr="http://www.praxis-campus.de/typo3temp/_processed_/csm_Maennchen_praesentiert_vor_Gruppe__c__fotomek_-_Fotolia.com__2__01_a96fa44d00.jpg"/>
+          <p:cNvPicPr>
+            <a:picLocks noChangeAspect="1" noChangeArrowheads="1"/>
+          </p:cNvPicPr>
+          <p:nvPr/>
+        </p:nvPicPr>
+        <p:blipFill>
+          <a:blip r:embed="rId3">
+            <a:extLst>
+              <a:ext uri="{28A0092B-C50C-407E-A947-70E740481C1C}">
+                <a14:useLocalDpi xmlns:a14="http://schemas.microsoft.com/office/drawing/2010/main" val="0"/>
+              </a:ext>
+            </a:extLst>
+          </a:blip>
+          <a:srcRect/>
+          <a:stretch>
+            <a:fillRect/>
+          </a:stretch>
+        </p:blipFill>
+        <p:spPr bwMode="auto">
+          <a:xfrm>
+            <a:off x="5725409" y="3674015"/>
+            <a:ext cx="3333750" cy="2724151"/>
+          </a:xfrm>
+          <a:prstGeom prst="rect">
+            <a:avLst/>
+          </a:prstGeom>
+          <a:noFill/>
+          <a:extLst>
+            <a:ext uri="{909E8E84-426E-40DD-AFC4-6F175D3DCCD1}">
+              <a14:hiddenFill xmlns:a14="http://schemas.microsoft.com/office/drawing/2010/main">
+                <a:solidFill>
+                  <a:srgbClr val="FFFFFF"/>
+                </a:solidFill>
+              </a14:hiddenFill>
+            </a:ext>
+          </a:extLst>
+        </p:spPr>
+      </p:pic>
+      <p:pic>
+        <p:nvPicPr>
+          <p:cNvPr id="4" name="Grafik 3"/>
+          <p:cNvPicPr>
+            <a:picLocks noChangeAspect="1"/>
+          </p:cNvPicPr>
+          <p:nvPr/>
+        </p:nvPicPr>
+        <p:blipFill>
+          <a:blip r:embed="rId4">
+            <a:extLst>
+              <a:ext uri="{28A0092B-C50C-407E-A947-70E740481C1C}">
+                <a14:useLocalDpi xmlns:a14="http://schemas.microsoft.com/office/drawing/2010/main" val="0"/>
+              </a:ext>
+            </a:extLst>
+          </a:blip>
+          <a:stretch>
+            <a:fillRect/>
+          </a:stretch>
+        </p:blipFill>
+        <p:spPr>
+          <a:xfrm>
+            <a:off x="1593131" y="2714919"/>
+            <a:ext cx="3456495" cy="2592371"/>
+          </a:xfrm>
+          <a:prstGeom prst="rect">
+            <a:avLst/>
+          </a:prstGeom>
+        </p:spPr>
+      </p:pic>
     </p:spTree>
     <p:extLst>
       <p:ext uri="{BB962C8B-B14F-4D97-AF65-F5344CB8AC3E}">

</xml_diff>

<commit_message>
Hindernisse um Punkt "GtkAda" erweitert, brauch noch ne Folie
</commit_message>
<xml_diff>
--- a/documentation/Ada Chat.pptx
+++ b/documentation/Ada Chat.pptx
@@ -3311,11 +3311,11 @@
   <p:clrMapOvr>
     <a:masterClrMapping/>
   </p:clrMapOvr>
-  <mc:AlternateContent xmlns:mc="http://schemas.openxmlformats.org/markup-compatibility/2006">
-    <mc:Choice xmlns:p14="http://schemas.microsoft.com/office/powerpoint/2010/main" Requires="p14">
+  <mc:AlternateContent xmlns:mc="http://schemas.openxmlformats.org/markup-compatibility/2006" xmlns:p14="http://schemas.microsoft.com/office/powerpoint/2010/main">
+    <mc:Choice Requires="p14">
       <p:transition spd="slow" p14:dur="2000"/>
     </mc:Choice>
-    <mc:Fallback>
+    <mc:Fallback xmlns="">
       <p:transition spd="slow"/>
     </mc:Fallback>
   </mc:AlternateContent>
@@ -7972,11 +7972,11 @@
   <p:clrMapOvr>
     <a:masterClrMapping/>
   </p:clrMapOvr>
-  <mc:AlternateContent xmlns:mc="http://schemas.openxmlformats.org/markup-compatibility/2006">
-    <mc:Choice xmlns:p14="http://schemas.microsoft.com/office/powerpoint/2010/main" Requires="p14">
+  <mc:AlternateContent xmlns:mc="http://schemas.openxmlformats.org/markup-compatibility/2006" xmlns:p14="http://schemas.microsoft.com/office/powerpoint/2010/main">
+    <mc:Choice Requires="p14">
       <p:transition spd="slow" p14:dur="2000"/>
     </mc:Choice>
-    <mc:Fallback>
+    <mc:Fallback xmlns="">
       <p:transition spd="slow"/>
     </mc:Fallback>
   </mc:AlternateContent>
@@ -8149,8 +8149,24 @@
           <a:p>
             <a:r>
               <a:rPr lang="de-DE" dirty="0"/>
-              <a:t>Dokumentation von Ada und GTK</a:t>
-            </a:r>
+              <a:t>Dokumentation </a:t>
+            </a:r>
+            <a:r>
+              <a:rPr lang="de-DE"/>
+              <a:t>von </a:t>
+            </a:r>
+            <a:r>
+              <a:rPr lang="de-DE" smtClean="0"/>
+              <a:t>Ada</a:t>
+            </a:r>
+            <a:endParaRPr lang="de-DE" dirty="0" smtClean="0"/>
+          </a:p>
+          <a:p>
+            <a:r>
+              <a:rPr lang="de-DE" dirty="0" err="1" smtClean="0"/>
+              <a:t>GtkAda</a:t>
+            </a:r>
+            <a:endParaRPr lang="de-DE" dirty="0"/>
           </a:p>
           <a:p>
             <a:r>
@@ -20509,11 +20525,11 @@
   <p:clrMapOvr>
     <a:masterClrMapping/>
   </p:clrMapOvr>
-  <mc:AlternateContent xmlns:mc="http://schemas.openxmlformats.org/markup-compatibility/2006">
-    <mc:Choice xmlns:p14="http://schemas.microsoft.com/office/powerpoint/2010/main" Requires="p14">
+  <mc:AlternateContent xmlns:mc="http://schemas.openxmlformats.org/markup-compatibility/2006" xmlns:p14="http://schemas.microsoft.com/office/powerpoint/2010/main">
+    <mc:Choice Requires="p14">
       <p:transition spd="slow" p14:dur="2000"/>
     </mc:Choice>
-    <mc:Fallback>
+    <mc:Fallback xmlns="">
       <p:transition spd="slow"/>
     </mc:Fallback>
   </mc:AlternateContent>

</xml_diff>